<commit_message>
Scaling design for more realistic view
</commit_message>
<xml_diff>
--- a/Mockups/ThetaTauWebsiteMockup.pptx
+++ b/Mockups/ThetaTauWebsiteMockup.pptx
@@ -6,10 +6,10 @@
   </p:sldMasterIdLst>
   <p:sldIdLst>
     <p:sldId id="257" r:id="rId2"/>
-    <p:sldId id="258" r:id="rId3"/>
+    <p:sldId id="262" r:id="rId3"/>
     <p:sldId id="260" r:id="rId4"/>
-    <p:sldId id="261" r:id="rId5"/>
-    <p:sldId id="259" r:id="rId6"/>
+    <p:sldId id="264" r:id="rId5"/>
+    <p:sldId id="263" r:id="rId6"/>
   </p:sldIdLst>
   <p:sldSz cx="12192000" cy="6858000"/>
   <p:notesSz cx="6858000" cy="9144000"/>
@@ -3007,20 +3007,22 @@
       </p:pic>
       <p:sp>
         <p:nvSpPr>
-          <p:cNvPr id="3" name="Rectangle 2"/>
+          <p:cNvPr id="19" name="Rectangle 18"/>
           <p:cNvSpPr/>
           <p:nvPr/>
         </p:nvSpPr>
         <p:spPr>
           <a:xfrm>
-            <a:off x="0" y="0"/>
-            <a:ext cx="12192000" cy="1107831"/>
+            <a:off x="0" y="447655"/>
+            <a:ext cx="12192000" cy="1376291"/>
           </a:xfrm>
           <a:prstGeom prst="rect">
             <a:avLst/>
           </a:prstGeom>
           <a:solidFill>
-            <a:srgbClr val="C00000"/>
+            <a:schemeClr val="bg2">
+              <a:alpha val="40000"/>
+            </a:schemeClr>
           </a:solidFill>
           <a:ln>
             <a:noFill/>
@@ -3047,157 +3049,45 @@
           <a:lstStyle/>
           <a:p>
             <a:pPr algn="ctr"/>
-            <a:endParaRPr lang="en-US"/>
-          </a:p>
-        </p:txBody>
-      </p:sp>
-      <p:pic>
-        <p:nvPicPr>
-          <p:cNvPr id="7" name="Picture 6"/>
-          <p:cNvPicPr>
-            <a:picLocks noChangeAspect="1"/>
-          </p:cNvPicPr>
-          <p:nvPr/>
-        </p:nvPicPr>
-        <p:blipFill>
-          <a:blip r:embed="rId3" cstate="screen">
-            <a:extLst>
-              <a:ext uri="{28A0092B-C50C-407E-A947-70E740481C1C}">
-                <a14:useLocalDpi xmlns:a14="http://schemas.microsoft.com/office/drawing/2010/main"/>
-              </a:ext>
-            </a:extLst>
-          </a:blip>
-          <a:stretch>
-            <a:fillRect/>
-          </a:stretch>
-        </p:blipFill>
-        <p:spPr>
-          <a:xfrm>
-            <a:off x="129817" y="182879"/>
-            <a:ext cx="479782" cy="742071"/>
-          </a:xfrm>
-          <a:prstGeom prst="rect">
-            <a:avLst/>
-          </a:prstGeom>
-        </p:spPr>
-      </p:pic>
-      <p:sp>
-        <p:nvSpPr>
-          <p:cNvPr id="8" name="TextBox 7"/>
-          <p:cNvSpPr txBox="1"/>
-          <p:nvPr/>
-        </p:nvSpPr>
-        <p:spPr>
-          <a:xfrm>
-            <a:off x="739416" y="-51160"/>
-            <a:ext cx="4678680" cy="1077218"/>
-          </a:xfrm>
-          <a:prstGeom prst="rect">
-            <a:avLst/>
-          </a:prstGeom>
-          <a:noFill/>
-        </p:spPr>
-        <p:txBody>
-          <a:bodyPr wrap="square" rtlCol="0">
-            <a:spAutoFit/>
-          </a:bodyPr>
-          <a:lstStyle/>
-          <a:p>
-            <a:r>
-              <a:rPr lang="en-US" sz="3600" b="1" dirty="0">
-                <a:solidFill>
-                  <a:srgbClr val="FFC000"/>
-                </a:solidFill>
-                <a:latin typeface="Bodoni 72 Smallcaps Book" charset="0"/>
-                <a:ea typeface="Bodoni 72 Smallcaps Book" charset="0"/>
-                <a:cs typeface="Bodoni 72 Smallcaps Book" charset="0"/>
-              </a:rPr>
-              <a:t>t</a:t>
-            </a:r>
-            <a:r>
-              <a:rPr lang="en-US" sz="3600" b="1" dirty="0" smtClean="0">
-                <a:solidFill>
-                  <a:srgbClr val="FFC000"/>
-                </a:solidFill>
-                <a:latin typeface="Bodoni 72 Smallcaps Book" charset="0"/>
-                <a:ea typeface="Bodoni 72 Smallcaps Book" charset="0"/>
-                <a:cs typeface="Bodoni 72 Smallcaps Book" charset="0"/>
-              </a:rPr>
-              <a:t>heta tau</a:t>
-            </a:r>
-          </a:p>
-          <a:p>
-            <a:r>
-              <a:rPr lang="en-US" sz="1400" b="1" dirty="0" smtClean="0">
-                <a:solidFill>
-                  <a:srgbClr val="FFC000"/>
-                </a:solidFill>
-                <a:latin typeface="Bodoni 72 Smallcaps Book" charset="0"/>
-                <a:ea typeface="Bodoni 72 Smallcaps Book" charset="0"/>
-                <a:cs typeface="Bodoni 72 Smallcaps Book" charset="0"/>
-              </a:rPr>
-              <a:t>PROFESSIONAL ENGINEERING </a:t>
-            </a:r>
-          </a:p>
-          <a:p>
-            <a:r>
-              <a:rPr lang="en-US" sz="1400" b="1" dirty="0" smtClean="0">
-                <a:solidFill>
-                  <a:srgbClr val="FFC000"/>
-                </a:solidFill>
-                <a:latin typeface="Bodoni 72 Smallcaps Book" charset="0"/>
-                <a:ea typeface="Bodoni 72 Smallcaps Book" charset="0"/>
-                <a:cs typeface="Bodoni 72 Smallcaps Book" charset="0"/>
-              </a:rPr>
-              <a:t>FRATERNITY</a:t>
-            </a:r>
-            <a:endParaRPr lang="en-US" sz="1600" b="1" dirty="0" smtClean="0">
-              <a:solidFill>
-                <a:srgbClr val="FFC000"/>
-              </a:solidFill>
-              <a:latin typeface="Bodoni 72 Smallcaps Book" charset="0"/>
-              <a:ea typeface="Bodoni 72 Smallcaps Book" charset="0"/>
-              <a:cs typeface="Bodoni 72 Smallcaps Book" charset="0"/>
-            </a:endParaRPr>
-          </a:p>
-        </p:txBody>
-      </p:sp>
-      <p:sp>
-        <p:nvSpPr>
-          <p:cNvPr id="9" name="TextBox 8"/>
-          <p:cNvSpPr txBox="1"/>
-          <p:nvPr/>
-        </p:nvSpPr>
-        <p:spPr>
-          <a:xfrm>
-            <a:off x="4023360" y="362296"/>
-            <a:ext cx="1049097" cy="369332"/>
-          </a:xfrm>
-          <a:prstGeom prst="rect">
-            <a:avLst/>
-          </a:prstGeom>
-          <a:noFill/>
-        </p:spPr>
-        <p:txBody>
-          <a:bodyPr wrap="square" rtlCol="0">
-            <a:spAutoFit/>
-          </a:bodyPr>
-          <a:lstStyle/>
-          <a:p>
-            <a:r>
-              <a:rPr lang="en-US" dirty="0" smtClean="0">
-                <a:solidFill>
-                  <a:schemeClr val="bg2"/>
+            <a:r>
+              <a:rPr lang="en-US" sz="3200" b="1" dirty="0" smtClean="0">
+                <a:solidFill>
+                  <a:srgbClr val="C00000"/>
                 </a:solidFill>
                 <a:latin typeface="Copperplate Gothic Bold" charset="0"/>
                 <a:ea typeface="Copperplate Gothic Bold" charset="0"/>
                 <a:cs typeface="Copperplate Gothic Bold" charset="0"/>
               </a:rPr>
-              <a:t>about</a:t>
-            </a:r>
-            <a:endParaRPr lang="en-US" sz="1200" dirty="0">
+              <a:t>Theta Gamma Chapter</a:t>
+            </a:r>
+          </a:p>
+          <a:p>
+            <a:pPr algn="ctr"/>
+            <a:r>
+              <a:rPr lang="en-US" sz="2000" b="1" dirty="0">
+                <a:solidFill>
+                  <a:srgbClr val="C00000"/>
+                </a:solidFill>
+                <a:latin typeface="Copperplate Gothic Bold" charset="0"/>
+                <a:ea typeface="Copperplate Gothic Bold" charset="0"/>
+                <a:cs typeface="Copperplate Gothic Bold" charset="0"/>
+              </a:rPr>
+              <a:t>t</a:t>
+            </a:r>
+            <a:r>
+              <a:rPr lang="en-US" sz="2000" b="1" dirty="0" smtClean="0">
+                <a:solidFill>
+                  <a:srgbClr val="C00000"/>
+                </a:solidFill>
+                <a:latin typeface="Copperplate Gothic Bold" charset="0"/>
+                <a:ea typeface="Copperplate Gothic Bold" charset="0"/>
+                <a:cs typeface="Copperplate Gothic Bold" charset="0"/>
+              </a:rPr>
+              <a:t>he university of michigan</a:t>
+            </a:r>
+            <a:endParaRPr lang="en-US" sz="2000" b="1" dirty="0">
               <a:solidFill>
-                <a:schemeClr val="bg2"/>
+                <a:srgbClr val="C00000"/>
               </a:solidFill>
               <a:latin typeface="Copperplate Gothic Bold" charset="0"/>
               <a:ea typeface="Copperplate Gothic Bold" charset="0"/>
@@ -3208,14 +3098,90 @@
       </p:sp>
       <p:sp>
         <p:nvSpPr>
-          <p:cNvPr id="12" name="TextBox 11"/>
+          <p:cNvPr id="21" name="TextBox 20"/>
           <p:cNvSpPr txBox="1"/>
           <p:nvPr/>
         </p:nvSpPr>
         <p:spPr>
           <a:xfrm>
-            <a:off x="5310659" y="352332"/>
-            <a:ext cx="1349221" cy="369332"/>
+            <a:off x="1744326" y="1878548"/>
+            <a:ext cx="854721" cy="2646878"/>
+          </a:xfrm>
+          <a:prstGeom prst="rect">
+            <a:avLst/>
+          </a:prstGeom>
+          <a:noFill/>
+        </p:spPr>
+        <p:txBody>
+          <a:bodyPr wrap="none" rtlCol="0">
+            <a:spAutoFit/>
+          </a:bodyPr>
+          <a:lstStyle/>
+          <a:p>
+            <a:r>
+              <a:rPr lang="en-US" sz="16600" dirty="0" smtClean="0">
+                <a:solidFill>
+                  <a:schemeClr val="bg1"/>
+                </a:solidFill>
+              </a:rPr>
+              <a:t>{</a:t>
+            </a:r>
+            <a:endParaRPr lang="en-US" dirty="0">
+              <a:solidFill>
+                <a:schemeClr val="bg1"/>
+              </a:solidFill>
+            </a:endParaRPr>
+          </a:p>
+        </p:txBody>
+      </p:sp>
+      <p:sp>
+        <p:nvSpPr>
+          <p:cNvPr id="22" name="TextBox 21"/>
+          <p:cNvSpPr txBox="1"/>
+          <p:nvPr/>
+        </p:nvSpPr>
+        <p:spPr>
+          <a:xfrm>
+            <a:off x="5508810" y="1878548"/>
+            <a:ext cx="854721" cy="2646878"/>
+          </a:xfrm>
+          <a:prstGeom prst="rect">
+            <a:avLst/>
+          </a:prstGeom>
+          <a:noFill/>
+        </p:spPr>
+        <p:txBody>
+          <a:bodyPr wrap="none" rtlCol="0">
+            <a:spAutoFit/>
+          </a:bodyPr>
+          <a:lstStyle/>
+          <a:p>
+            <a:r>
+              <a:rPr lang="en-US" sz="16600" dirty="0">
+                <a:solidFill>
+                  <a:schemeClr val="bg1"/>
+                </a:solidFill>
+              </a:rPr>
+              <a:t>}</a:t>
+            </a:r>
+            <a:endParaRPr lang="en-US" dirty="0">
+              <a:solidFill>
+                <a:schemeClr val="bg1"/>
+              </a:solidFill>
+            </a:endParaRPr>
+          </a:p>
+        </p:txBody>
+      </p:sp>
+      <p:sp>
+        <p:nvSpPr>
+          <p:cNvPr id="23" name="TextBox 22"/>
+          <p:cNvSpPr txBox="1"/>
+          <p:nvPr/>
+        </p:nvSpPr>
+        <p:spPr>
+          <a:xfrm>
+            <a:off x="2599047" y="2691893"/>
+            <a:ext cx="3214360" cy="1477328"/>
           </a:xfrm>
           <a:prstGeom prst="rect">
             <a:avLst/>
@@ -3229,133 +3195,37 @@
           <a:lstStyle/>
           <a:p>
             <a:r>
-              <a:rPr lang="en-US" smtClean="0">
-                <a:solidFill>
-                  <a:schemeClr val="bg2"/>
-                </a:solidFill>
-                <a:latin typeface="Copperplate Gothic Bold" charset="0"/>
-                <a:ea typeface="Copperplate Gothic Bold" charset="0"/>
-                <a:cs typeface="Copperplate Gothic Bold" charset="0"/>
+              <a:rPr lang="en-US" b="1" i="1" dirty="0" smtClean="0">
+                <a:latin typeface="Segoe Print" charset="0"/>
+                <a:ea typeface="Segoe Print" charset="0"/>
+                <a:cs typeface="Segoe Print" charset="0"/>
               </a:rPr>
-              <a:t>members</a:t>
-            </a:r>
-            <a:endParaRPr lang="en-US" sz="1200" dirty="0">
-              <a:solidFill>
-                <a:schemeClr val="bg2"/>
-              </a:solidFill>
-              <a:latin typeface="Copperplate Gothic Bold" charset="0"/>
-              <a:ea typeface="Copperplate Gothic Bold" charset="0"/>
-              <a:cs typeface="Copperplate Gothic Bold" charset="0"/>
+              <a:t>“Theta Tau isn’t just a fraternity…it’s a brotherhood that likes to take pictures on very frozen lakes”</a:t>
+            </a:r>
+            <a:endParaRPr lang="en-US" b="1" i="1" dirty="0">
+              <a:latin typeface="Segoe Print" charset="0"/>
+              <a:ea typeface="Segoe Print" charset="0"/>
+              <a:cs typeface="Segoe Print" charset="0"/>
             </a:endParaRPr>
           </a:p>
         </p:txBody>
       </p:sp>
       <p:sp>
         <p:nvSpPr>
-          <p:cNvPr id="13" name="TextBox 12"/>
-          <p:cNvSpPr txBox="1"/>
-          <p:nvPr/>
-        </p:nvSpPr>
-        <p:spPr>
-          <a:xfrm>
-            <a:off x="6834934" y="352332"/>
-            <a:ext cx="1349221" cy="369332"/>
-          </a:xfrm>
-          <a:prstGeom prst="rect">
-            <a:avLst/>
-          </a:prstGeom>
-          <a:noFill/>
-        </p:spPr>
-        <p:txBody>
-          <a:bodyPr wrap="square" rtlCol="0">
-            <a:spAutoFit/>
-          </a:bodyPr>
-          <a:lstStyle/>
-          <a:p>
-            <a:r>
-              <a:rPr lang="en-US" dirty="0" smtClean="0">
-                <a:solidFill>
-                  <a:schemeClr val="bg2"/>
-                </a:solidFill>
-                <a:latin typeface="Copperplate Gothic Bold" charset="0"/>
-                <a:ea typeface="Copperplate Gothic Bold" charset="0"/>
-                <a:cs typeface="Copperplate Gothic Bold" charset="0"/>
-              </a:rPr>
-              <a:t>history</a:t>
-            </a:r>
-            <a:endParaRPr lang="en-US" sz="1200" dirty="0">
-              <a:solidFill>
-                <a:schemeClr val="bg2"/>
-              </a:solidFill>
-              <a:latin typeface="Copperplate Gothic Bold" charset="0"/>
-              <a:ea typeface="Copperplate Gothic Bold" charset="0"/>
-              <a:cs typeface="Copperplate Gothic Bold" charset="0"/>
-            </a:endParaRPr>
-          </a:p>
-        </p:txBody>
-      </p:sp>
-      <p:sp>
-        <p:nvSpPr>
-          <p:cNvPr id="14" name="TextBox 13"/>
-          <p:cNvSpPr txBox="1"/>
-          <p:nvPr/>
-        </p:nvSpPr>
-        <p:spPr>
-          <a:xfrm>
-            <a:off x="8282734" y="352332"/>
-            <a:ext cx="1349221" cy="369332"/>
-          </a:xfrm>
-          <a:prstGeom prst="rect">
-            <a:avLst/>
-          </a:prstGeom>
-          <a:noFill/>
-        </p:spPr>
-        <p:txBody>
-          <a:bodyPr wrap="square" rtlCol="0">
-            <a:spAutoFit/>
-          </a:bodyPr>
-          <a:lstStyle/>
-          <a:p>
-            <a:r>
-              <a:rPr lang="en-US" dirty="0" smtClean="0">
-                <a:solidFill>
-                  <a:schemeClr val="bg2"/>
-                </a:solidFill>
-                <a:latin typeface="Copperplate Gothic Bold" charset="0"/>
-                <a:ea typeface="Copperplate Gothic Bold" charset="0"/>
-                <a:cs typeface="Copperplate Gothic Bold" charset="0"/>
-              </a:rPr>
-              <a:t>contact</a:t>
-            </a:r>
-            <a:endParaRPr lang="en-US" sz="1200" dirty="0">
-              <a:solidFill>
-                <a:schemeClr val="bg2"/>
-              </a:solidFill>
-              <a:latin typeface="Copperplate Gothic Bold" charset="0"/>
-              <a:ea typeface="Copperplate Gothic Bold" charset="0"/>
-              <a:cs typeface="Copperplate Gothic Bold" charset="0"/>
-            </a:endParaRPr>
-          </a:p>
-        </p:txBody>
-      </p:sp>
-      <p:sp>
-        <p:nvSpPr>
-          <p:cNvPr id="19" name="Rectangle 18"/>
+          <p:cNvPr id="3" name="Rectangle 2"/>
           <p:cNvSpPr/>
           <p:nvPr/>
         </p:nvSpPr>
         <p:spPr>
           <a:xfrm>
-            <a:off x="0" y="1107828"/>
-            <a:ext cx="12192000" cy="1376291"/>
+            <a:off x="0" y="-29177"/>
+            <a:ext cx="12192000" cy="476000"/>
           </a:xfrm>
           <a:prstGeom prst="rect">
             <a:avLst/>
           </a:prstGeom>
           <a:solidFill>
-            <a:schemeClr val="bg2">
-              <a:alpha val="40000"/>
-            </a:schemeClr>
+            <a:srgbClr val="C00000"/>
           </a:solidFill>
           <a:ln>
             <a:noFill/>
@@ -3382,201 +3252,143 @@
           <a:lstStyle/>
           <a:p>
             <a:pPr algn="ctr"/>
-            <a:r>
-              <a:rPr lang="en-US" sz="4000" b="1" dirty="0" smtClean="0">
-                <a:solidFill>
-                  <a:srgbClr val="C00000"/>
+            <a:endParaRPr lang="en-US"/>
+          </a:p>
+        </p:txBody>
+      </p:sp>
+      <p:pic>
+        <p:nvPicPr>
+          <p:cNvPr id="7" name="Picture 6"/>
+          <p:cNvPicPr>
+            <a:picLocks noChangeAspect="1"/>
+          </p:cNvPicPr>
+          <p:nvPr/>
+        </p:nvPicPr>
+        <p:blipFill>
+          <a:blip r:embed="rId3" cstate="screen">
+            <a:extLst>
+              <a:ext uri="{28A0092B-C50C-407E-A947-70E740481C1C}">
+                <a14:useLocalDpi xmlns:a14="http://schemas.microsoft.com/office/drawing/2010/main"/>
+              </a:ext>
+            </a:extLst>
+          </a:blip>
+          <a:stretch>
+            <a:fillRect/>
+          </a:stretch>
+        </p:blipFill>
+        <p:spPr>
+          <a:xfrm>
+            <a:off x="169325" y="25425"/>
+            <a:ext cx="200383" cy="318845"/>
+          </a:xfrm>
+          <a:prstGeom prst="rect">
+            <a:avLst/>
+          </a:prstGeom>
+        </p:spPr>
+      </p:pic>
+      <p:sp>
+        <p:nvSpPr>
+          <p:cNvPr id="8" name="TextBox 7"/>
+          <p:cNvSpPr txBox="1"/>
+          <p:nvPr/>
+        </p:nvSpPr>
+        <p:spPr>
+          <a:xfrm>
+            <a:off x="362337" y="-92117"/>
+            <a:ext cx="2574788" cy="477054"/>
+          </a:xfrm>
+          <a:prstGeom prst="rect">
+            <a:avLst/>
+          </a:prstGeom>
+          <a:noFill/>
+        </p:spPr>
+        <p:txBody>
+          <a:bodyPr wrap="square" rtlCol="0">
+            <a:spAutoFit/>
+          </a:bodyPr>
+          <a:lstStyle/>
+          <a:p>
+            <a:r>
+              <a:rPr lang="en-US" b="1" dirty="0">
+                <a:solidFill>
+                  <a:srgbClr val="FFC000"/>
+                </a:solidFill>
+                <a:latin typeface="Bodoni 72 Smallcaps Book" charset="0"/>
+                <a:ea typeface="Bodoni 72 Smallcaps Book" charset="0"/>
+                <a:cs typeface="Bodoni 72 Smallcaps Book" charset="0"/>
+              </a:rPr>
+              <a:t>t</a:t>
+            </a:r>
+            <a:r>
+              <a:rPr lang="en-US" b="1" dirty="0" smtClean="0">
+                <a:solidFill>
+                  <a:srgbClr val="FFC000"/>
+                </a:solidFill>
+                <a:latin typeface="Bodoni 72 Smallcaps Book" charset="0"/>
+                <a:ea typeface="Bodoni 72 Smallcaps Book" charset="0"/>
+                <a:cs typeface="Bodoni 72 Smallcaps Book" charset="0"/>
+              </a:rPr>
+              <a:t>heta tau</a:t>
+            </a:r>
+          </a:p>
+          <a:p>
+            <a:r>
+              <a:rPr lang="en-US" sz="700" b="1" dirty="0" smtClean="0">
+                <a:solidFill>
+                  <a:srgbClr val="FFC000"/>
+                </a:solidFill>
+                <a:latin typeface="Bodoni 72 Smallcaps Book" charset="0"/>
+                <a:ea typeface="Bodoni 72 Smallcaps Book" charset="0"/>
+                <a:cs typeface="Bodoni 72 Smallcaps Book" charset="0"/>
+              </a:rPr>
+              <a:t>PROFESSIONAL ENGINEERING FRATERNITY</a:t>
+            </a:r>
+            <a:endParaRPr lang="en-US" sz="800" b="1" dirty="0" smtClean="0">
+              <a:solidFill>
+                <a:srgbClr val="FFC000"/>
+              </a:solidFill>
+              <a:latin typeface="Bodoni 72 Smallcaps Book" charset="0"/>
+              <a:ea typeface="Bodoni 72 Smallcaps Book" charset="0"/>
+              <a:cs typeface="Bodoni 72 Smallcaps Book" charset="0"/>
+            </a:endParaRPr>
+          </a:p>
+        </p:txBody>
+      </p:sp>
+      <p:sp>
+        <p:nvSpPr>
+          <p:cNvPr id="9" name="TextBox 8"/>
+          <p:cNvSpPr txBox="1"/>
+          <p:nvPr/>
+        </p:nvSpPr>
+        <p:spPr>
+          <a:xfrm>
+            <a:off x="3738071" y="73931"/>
+            <a:ext cx="771641" cy="281281"/>
+          </a:xfrm>
+          <a:prstGeom prst="rect">
+            <a:avLst/>
+          </a:prstGeom>
+          <a:noFill/>
+        </p:spPr>
+        <p:txBody>
+          <a:bodyPr wrap="square" rtlCol="0">
+            <a:spAutoFit/>
+          </a:bodyPr>
+          <a:lstStyle/>
+          <a:p>
+            <a:pPr algn="ctr"/>
+            <a:r>
+              <a:rPr lang="en-US" sz="1200" dirty="0" smtClean="0">
+                <a:solidFill>
+                  <a:schemeClr val="bg2"/>
                 </a:solidFill>
                 <a:latin typeface="Copperplate Gothic Bold" charset="0"/>
                 <a:ea typeface="Copperplate Gothic Bold" charset="0"/>
                 <a:cs typeface="Copperplate Gothic Bold" charset="0"/>
               </a:rPr>
-              <a:t>Theta Gamma Chapter</a:t>
-            </a:r>
-          </a:p>
-          <a:p>
-            <a:pPr algn="ctr"/>
-            <a:r>
-              <a:rPr lang="en-US" sz="2400" b="1" dirty="0">
-                <a:solidFill>
-                  <a:srgbClr val="C00000"/>
-                </a:solidFill>
-                <a:latin typeface="Copperplate Gothic Bold" charset="0"/>
-                <a:ea typeface="Copperplate Gothic Bold" charset="0"/>
-                <a:cs typeface="Copperplate Gothic Bold" charset="0"/>
-              </a:rPr>
-              <a:t>t</a:t>
-            </a:r>
-            <a:r>
-              <a:rPr lang="en-US" sz="2400" b="1" dirty="0" smtClean="0">
-                <a:solidFill>
-                  <a:srgbClr val="C00000"/>
-                </a:solidFill>
-                <a:latin typeface="Copperplate Gothic Bold" charset="0"/>
-                <a:ea typeface="Copperplate Gothic Bold" charset="0"/>
-                <a:cs typeface="Copperplate Gothic Bold" charset="0"/>
-              </a:rPr>
-              <a:t>he university of michigan</a:t>
-            </a:r>
-            <a:endParaRPr lang="en-US" sz="2400" b="1" dirty="0">
-              <a:solidFill>
-                <a:srgbClr val="C00000"/>
-              </a:solidFill>
-              <a:latin typeface="Copperplate Gothic Bold" charset="0"/>
-              <a:ea typeface="Copperplate Gothic Bold" charset="0"/>
-              <a:cs typeface="Copperplate Gothic Bold" charset="0"/>
-            </a:endParaRPr>
-          </a:p>
-        </p:txBody>
-      </p:sp>
-      <p:sp>
-        <p:nvSpPr>
-          <p:cNvPr id="21" name="TextBox 20"/>
-          <p:cNvSpPr txBox="1"/>
-          <p:nvPr/>
-        </p:nvSpPr>
-        <p:spPr>
-          <a:xfrm>
-            <a:off x="609599" y="2331780"/>
-            <a:ext cx="854721" cy="2646878"/>
-          </a:xfrm>
-          <a:prstGeom prst="rect">
-            <a:avLst/>
-          </a:prstGeom>
-          <a:noFill/>
-        </p:spPr>
-        <p:txBody>
-          <a:bodyPr wrap="none" rtlCol="0">
-            <a:spAutoFit/>
-          </a:bodyPr>
-          <a:lstStyle/>
-          <a:p>
-            <a:r>
-              <a:rPr lang="en-US" sz="16600" dirty="0" smtClean="0">
-                <a:solidFill>
-                  <a:schemeClr val="bg1"/>
-                </a:solidFill>
-              </a:rPr>
-              <a:t>{</a:t>
-            </a:r>
-            <a:endParaRPr lang="en-US" dirty="0">
-              <a:solidFill>
-                <a:schemeClr val="bg1"/>
-              </a:solidFill>
-            </a:endParaRPr>
-          </a:p>
-        </p:txBody>
-      </p:sp>
-      <p:sp>
-        <p:nvSpPr>
-          <p:cNvPr id="22" name="TextBox 21"/>
-          <p:cNvSpPr txBox="1"/>
-          <p:nvPr/>
-        </p:nvSpPr>
-        <p:spPr>
-          <a:xfrm>
-            <a:off x="4374083" y="2331780"/>
-            <a:ext cx="854721" cy="2646878"/>
-          </a:xfrm>
-          <a:prstGeom prst="rect">
-            <a:avLst/>
-          </a:prstGeom>
-          <a:noFill/>
-        </p:spPr>
-        <p:txBody>
-          <a:bodyPr wrap="none" rtlCol="0">
-            <a:spAutoFit/>
-          </a:bodyPr>
-          <a:lstStyle/>
-          <a:p>
-            <a:r>
-              <a:rPr lang="en-US" sz="16600" dirty="0">
-                <a:solidFill>
-                  <a:schemeClr val="bg1"/>
-                </a:solidFill>
-              </a:rPr>
-              <a:t>}</a:t>
-            </a:r>
-            <a:endParaRPr lang="en-US" dirty="0">
-              <a:solidFill>
-                <a:schemeClr val="bg1"/>
-              </a:solidFill>
-            </a:endParaRPr>
-          </a:p>
-        </p:txBody>
-      </p:sp>
-      <p:sp>
-        <p:nvSpPr>
-          <p:cNvPr id="23" name="TextBox 22"/>
-          <p:cNvSpPr txBox="1"/>
-          <p:nvPr/>
-        </p:nvSpPr>
-        <p:spPr>
-          <a:xfrm>
-            <a:off x="1464320" y="3145125"/>
-            <a:ext cx="3214360" cy="1477328"/>
-          </a:xfrm>
-          <a:prstGeom prst="rect">
-            <a:avLst/>
-          </a:prstGeom>
-          <a:noFill/>
-        </p:spPr>
-        <p:txBody>
-          <a:bodyPr wrap="square" rtlCol="0">
-            <a:spAutoFit/>
-          </a:bodyPr>
-          <a:lstStyle/>
-          <a:p>
-            <a:r>
-              <a:rPr lang="en-US" b="1" i="1" dirty="0" smtClean="0">
-                <a:latin typeface="Segoe Print" charset="0"/>
-                <a:ea typeface="Segoe Print" charset="0"/>
-                <a:cs typeface="Segoe Print" charset="0"/>
-              </a:rPr>
-              <a:t>“Theta Tau isn’t just a fraternity…it’s a brotherhood that likes to take pictures on very frozen lakes”</a:t>
-            </a:r>
-            <a:endParaRPr lang="en-US" b="1" i="1" dirty="0">
-              <a:latin typeface="Segoe Print" charset="0"/>
-              <a:ea typeface="Segoe Print" charset="0"/>
-              <a:cs typeface="Segoe Print" charset="0"/>
-            </a:endParaRPr>
-          </a:p>
-        </p:txBody>
-      </p:sp>
-      <p:sp>
-        <p:nvSpPr>
-          <p:cNvPr id="24" name="TextBox 23"/>
-          <p:cNvSpPr txBox="1"/>
-          <p:nvPr/>
-        </p:nvSpPr>
-        <p:spPr>
-          <a:xfrm>
-            <a:off x="10967891" y="352331"/>
-            <a:ext cx="965030" cy="369332"/>
-          </a:xfrm>
-          <a:prstGeom prst="rect">
-            <a:avLst/>
-          </a:prstGeom>
-          <a:noFill/>
-        </p:spPr>
-        <p:txBody>
-          <a:bodyPr wrap="square" rtlCol="0">
-            <a:spAutoFit/>
-          </a:bodyPr>
-          <a:lstStyle/>
-          <a:p>
-            <a:r>
-              <a:rPr lang="en-US" dirty="0" smtClean="0">
-                <a:solidFill>
-                  <a:schemeClr val="bg2"/>
-                </a:solidFill>
-                <a:latin typeface="Copperplate Gothic Bold" charset="0"/>
-                <a:ea typeface="Copperplate Gothic Bold" charset="0"/>
-                <a:cs typeface="Copperplate Gothic Bold" charset="0"/>
-              </a:rPr>
-              <a:t>login</a:t>
-            </a:r>
-            <a:endParaRPr lang="en-US" sz="1200" dirty="0">
+              <a:t>about</a:t>
+            </a:r>
+            <a:endParaRPr lang="en-US" sz="1000" dirty="0">
               <a:solidFill>
                 <a:schemeClr val="bg2"/>
               </a:solidFill>
@@ -3589,14 +3401,194 @@
       </p:sp>
       <p:sp>
         <p:nvSpPr>
+          <p:cNvPr id="12" name="TextBox 11"/>
+          <p:cNvSpPr txBox="1"/>
+          <p:nvPr/>
+        </p:nvSpPr>
+        <p:spPr>
+          <a:xfrm>
+            <a:off x="4709011" y="62156"/>
+            <a:ext cx="951245" cy="277000"/>
+          </a:xfrm>
+          <a:prstGeom prst="rect">
+            <a:avLst/>
+          </a:prstGeom>
+          <a:noFill/>
+        </p:spPr>
+        <p:txBody>
+          <a:bodyPr wrap="square" rtlCol="0">
+            <a:spAutoFit/>
+          </a:bodyPr>
+          <a:lstStyle/>
+          <a:p>
+            <a:pPr algn="ctr"/>
+            <a:r>
+              <a:rPr lang="en-US" sz="1200" dirty="0" smtClean="0">
+                <a:solidFill>
+                  <a:schemeClr val="bg2"/>
+                </a:solidFill>
+                <a:latin typeface="Copperplate Gothic Bold" charset="0"/>
+                <a:ea typeface="Copperplate Gothic Bold" charset="0"/>
+                <a:cs typeface="Copperplate Gothic Bold" charset="0"/>
+              </a:rPr>
+              <a:t>members</a:t>
+            </a:r>
+            <a:endParaRPr lang="en-US" sz="1000" dirty="0">
+              <a:solidFill>
+                <a:schemeClr val="bg2"/>
+              </a:solidFill>
+              <a:latin typeface="Copperplate Gothic Bold" charset="0"/>
+              <a:ea typeface="Copperplate Gothic Bold" charset="0"/>
+              <a:cs typeface="Copperplate Gothic Bold" charset="0"/>
+            </a:endParaRPr>
+          </a:p>
+        </p:txBody>
+      </p:sp>
+      <p:sp>
+        <p:nvSpPr>
+          <p:cNvPr id="13" name="TextBox 12"/>
+          <p:cNvSpPr txBox="1"/>
+          <p:nvPr/>
+        </p:nvSpPr>
+        <p:spPr>
+          <a:xfrm>
+            <a:off x="5936171" y="69497"/>
+            <a:ext cx="920104" cy="277000"/>
+          </a:xfrm>
+          <a:prstGeom prst="rect">
+            <a:avLst/>
+          </a:prstGeom>
+          <a:noFill/>
+        </p:spPr>
+        <p:txBody>
+          <a:bodyPr wrap="square" rtlCol="0">
+            <a:spAutoFit/>
+          </a:bodyPr>
+          <a:lstStyle/>
+          <a:p>
+            <a:pPr algn="ctr"/>
+            <a:r>
+              <a:rPr lang="en-US" sz="1200" dirty="0" smtClean="0">
+                <a:solidFill>
+                  <a:schemeClr val="bg2"/>
+                </a:solidFill>
+                <a:latin typeface="Copperplate Gothic Bold" charset="0"/>
+                <a:ea typeface="Copperplate Gothic Bold" charset="0"/>
+                <a:cs typeface="Copperplate Gothic Bold" charset="0"/>
+              </a:rPr>
+              <a:t>history</a:t>
+            </a:r>
+            <a:endParaRPr lang="en-US" sz="1000" dirty="0">
+              <a:solidFill>
+                <a:schemeClr val="bg2"/>
+              </a:solidFill>
+              <a:latin typeface="Copperplate Gothic Bold" charset="0"/>
+              <a:ea typeface="Copperplate Gothic Bold" charset="0"/>
+              <a:cs typeface="Copperplate Gothic Bold" charset="0"/>
+            </a:endParaRPr>
+          </a:p>
+        </p:txBody>
+      </p:sp>
+      <p:sp>
+        <p:nvSpPr>
+          <p:cNvPr id="14" name="TextBox 13"/>
+          <p:cNvSpPr txBox="1"/>
+          <p:nvPr/>
+        </p:nvSpPr>
+        <p:spPr>
+          <a:xfrm>
+            <a:off x="7132190" y="65724"/>
+            <a:ext cx="942289" cy="277000"/>
+          </a:xfrm>
+          <a:prstGeom prst="rect">
+            <a:avLst/>
+          </a:prstGeom>
+          <a:noFill/>
+        </p:spPr>
+        <p:txBody>
+          <a:bodyPr wrap="square" rtlCol="0">
+            <a:spAutoFit/>
+          </a:bodyPr>
+          <a:lstStyle/>
+          <a:p>
+            <a:pPr algn="ctr"/>
+            <a:r>
+              <a:rPr lang="en-US" sz="1200" dirty="0" smtClean="0">
+                <a:solidFill>
+                  <a:schemeClr val="bg2"/>
+                </a:solidFill>
+                <a:latin typeface="Copperplate Gothic Bold" charset="0"/>
+                <a:ea typeface="Copperplate Gothic Bold" charset="0"/>
+                <a:cs typeface="Copperplate Gothic Bold" charset="0"/>
+              </a:rPr>
+              <a:t>contact</a:t>
+            </a:r>
+            <a:endParaRPr lang="en-US" sz="1000" dirty="0">
+              <a:solidFill>
+                <a:schemeClr val="bg2"/>
+              </a:solidFill>
+              <a:latin typeface="Copperplate Gothic Bold" charset="0"/>
+              <a:ea typeface="Copperplate Gothic Bold" charset="0"/>
+              <a:cs typeface="Copperplate Gothic Bold" charset="0"/>
+            </a:endParaRPr>
+          </a:p>
+        </p:txBody>
+      </p:sp>
+      <p:sp>
+        <p:nvSpPr>
+          <p:cNvPr id="24" name="TextBox 23"/>
+          <p:cNvSpPr txBox="1"/>
+          <p:nvPr/>
+        </p:nvSpPr>
+        <p:spPr>
+          <a:xfrm>
+            <a:off x="11259927" y="49716"/>
+            <a:ext cx="687815" cy="276999"/>
+          </a:xfrm>
+          <a:prstGeom prst="rect">
+            <a:avLst/>
+          </a:prstGeom>
+          <a:noFill/>
+        </p:spPr>
+        <p:txBody>
+          <a:bodyPr wrap="square" rtlCol="0">
+            <a:spAutoFit/>
+          </a:bodyPr>
+          <a:lstStyle/>
+          <a:p>
+            <a:pPr algn="ctr"/>
+            <a:r>
+              <a:rPr lang="en-US" sz="1200" dirty="0" smtClean="0">
+                <a:solidFill>
+                  <a:schemeClr val="bg2"/>
+                </a:solidFill>
+                <a:latin typeface="Copperplate Gothic Bold" charset="0"/>
+                <a:ea typeface="Copperplate Gothic Bold" charset="0"/>
+                <a:cs typeface="Copperplate Gothic Bold" charset="0"/>
+              </a:rPr>
+              <a:t>login</a:t>
+            </a:r>
+            <a:endParaRPr lang="en-US" sz="1000" dirty="0">
+              <a:solidFill>
+                <a:schemeClr val="bg2"/>
+              </a:solidFill>
+              <a:latin typeface="Copperplate Gothic Bold" charset="0"/>
+              <a:ea typeface="Copperplate Gothic Bold" charset="0"/>
+              <a:cs typeface="Copperplate Gothic Bold" charset="0"/>
+            </a:endParaRPr>
+          </a:p>
+        </p:txBody>
+      </p:sp>
+      <p:sp>
+        <p:nvSpPr>
           <p:cNvPr id="25" name="Rectangle 24"/>
           <p:cNvSpPr/>
           <p:nvPr/>
         </p:nvSpPr>
         <p:spPr>
           <a:xfrm>
-            <a:off x="-9530" y="1024640"/>
-            <a:ext cx="3314204" cy="76984"/>
+            <a:off x="0" y="369769"/>
+            <a:ext cx="2421467" cy="74881"/>
           </a:xfrm>
           <a:prstGeom prst="rect">
             <a:avLst/>
@@ -3641,7 +3633,7 @@
         </p:nvSpPr>
         <p:spPr>
           <a:xfrm>
-            <a:off x="5148183" y="3714275"/>
+            <a:off x="6282910" y="3261043"/>
             <a:ext cx="2356997" cy="646331"/>
           </a:xfrm>
           <a:prstGeom prst="rect">
@@ -3738,7 +3730,7 @@
         </p:blipFill>
         <p:spPr>
           <a:xfrm>
-            <a:off x="0" y="32084"/>
+            <a:off x="0" y="25425"/>
             <a:ext cx="12192000" cy="6858000"/>
           </a:xfrm>
           <a:prstGeom prst="rect">
@@ -3748,20 +3740,22 @@
       </p:pic>
       <p:sp>
         <p:nvSpPr>
-          <p:cNvPr id="3" name="Rectangle 2"/>
+          <p:cNvPr id="19" name="Rectangle 18"/>
           <p:cNvSpPr/>
           <p:nvPr/>
         </p:nvSpPr>
         <p:spPr>
           <a:xfrm>
-            <a:off x="0" y="0"/>
-            <a:ext cx="12192000" cy="1107831"/>
+            <a:off x="0" y="447655"/>
+            <a:ext cx="12192000" cy="1376291"/>
           </a:xfrm>
           <a:prstGeom prst="rect">
             <a:avLst/>
           </a:prstGeom>
           <a:solidFill>
-            <a:srgbClr val="C00000"/>
+            <a:schemeClr val="bg2">
+              <a:alpha val="40000"/>
+            </a:schemeClr>
           </a:solidFill>
           <a:ln>
             <a:noFill/>
@@ -3788,157 +3782,45 @@
           <a:lstStyle/>
           <a:p>
             <a:pPr algn="ctr"/>
-            <a:endParaRPr lang="en-US"/>
-          </a:p>
-        </p:txBody>
-      </p:sp>
-      <p:pic>
-        <p:nvPicPr>
-          <p:cNvPr id="7" name="Picture 6"/>
-          <p:cNvPicPr>
-            <a:picLocks noChangeAspect="1"/>
-          </p:cNvPicPr>
-          <p:nvPr/>
-        </p:nvPicPr>
-        <p:blipFill>
-          <a:blip r:embed="rId3" cstate="screen">
-            <a:extLst>
-              <a:ext uri="{28A0092B-C50C-407E-A947-70E740481C1C}">
-                <a14:useLocalDpi xmlns:a14="http://schemas.microsoft.com/office/drawing/2010/main"/>
-              </a:ext>
-            </a:extLst>
-          </a:blip>
-          <a:stretch>
-            <a:fillRect/>
-          </a:stretch>
-        </p:blipFill>
-        <p:spPr>
-          <a:xfrm>
-            <a:off x="129817" y="182879"/>
-            <a:ext cx="479782" cy="742071"/>
-          </a:xfrm>
-          <a:prstGeom prst="rect">
-            <a:avLst/>
-          </a:prstGeom>
-        </p:spPr>
-      </p:pic>
-      <p:sp>
-        <p:nvSpPr>
-          <p:cNvPr id="8" name="TextBox 7"/>
-          <p:cNvSpPr txBox="1"/>
-          <p:nvPr/>
-        </p:nvSpPr>
-        <p:spPr>
-          <a:xfrm>
-            <a:off x="739416" y="-51160"/>
-            <a:ext cx="4678680" cy="1077218"/>
-          </a:xfrm>
-          <a:prstGeom prst="rect">
-            <a:avLst/>
-          </a:prstGeom>
-          <a:noFill/>
-        </p:spPr>
-        <p:txBody>
-          <a:bodyPr wrap="square" rtlCol="0">
-            <a:spAutoFit/>
-          </a:bodyPr>
-          <a:lstStyle/>
-          <a:p>
-            <a:r>
-              <a:rPr lang="en-US" sz="3600" b="1" dirty="0">
-                <a:solidFill>
-                  <a:srgbClr val="FFC000"/>
-                </a:solidFill>
-                <a:latin typeface="Bodoni 72 Smallcaps Book" charset="0"/>
-                <a:ea typeface="Bodoni 72 Smallcaps Book" charset="0"/>
-                <a:cs typeface="Bodoni 72 Smallcaps Book" charset="0"/>
-              </a:rPr>
-              <a:t>t</a:t>
-            </a:r>
-            <a:r>
-              <a:rPr lang="en-US" sz="3600" b="1" dirty="0" smtClean="0">
-                <a:solidFill>
-                  <a:srgbClr val="FFC000"/>
-                </a:solidFill>
-                <a:latin typeface="Bodoni 72 Smallcaps Book" charset="0"/>
-                <a:ea typeface="Bodoni 72 Smallcaps Book" charset="0"/>
-                <a:cs typeface="Bodoni 72 Smallcaps Book" charset="0"/>
-              </a:rPr>
-              <a:t>heta tau</a:t>
-            </a:r>
-          </a:p>
-          <a:p>
-            <a:r>
-              <a:rPr lang="en-US" sz="1400" b="1" dirty="0" smtClean="0">
-                <a:solidFill>
-                  <a:srgbClr val="FFC000"/>
-                </a:solidFill>
-                <a:latin typeface="Bodoni 72 Smallcaps Book" charset="0"/>
-                <a:ea typeface="Bodoni 72 Smallcaps Book" charset="0"/>
-                <a:cs typeface="Bodoni 72 Smallcaps Book" charset="0"/>
-              </a:rPr>
-              <a:t>PROFESSIONAL ENGINEERING </a:t>
-            </a:r>
-          </a:p>
-          <a:p>
-            <a:r>
-              <a:rPr lang="en-US" sz="1400" b="1" dirty="0" smtClean="0">
-                <a:solidFill>
-                  <a:srgbClr val="FFC000"/>
-                </a:solidFill>
-                <a:latin typeface="Bodoni 72 Smallcaps Book" charset="0"/>
-                <a:ea typeface="Bodoni 72 Smallcaps Book" charset="0"/>
-                <a:cs typeface="Bodoni 72 Smallcaps Book" charset="0"/>
-              </a:rPr>
-              <a:t>FRATERNITY</a:t>
-            </a:r>
-            <a:endParaRPr lang="en-US" sz="1600" b="1" dirty="0" smtClean="0">
-              <a:solidFill>
-                <a:srgbClr val="FFC000"/>
-              </a:solidFill>
-              <a:latin typeface="Bodoni 72 Smallcaps Book" charset="0"/>
-              <a:ea typeface="Bodoni 72 Smallcaps Book" charset="0"/>
-              <a:cs typeface="Bodoni 72 Smallcaps Book" charset="0"/>
-            </a:endParaRPr>
-          </a:p>
-        </p:txBody>
-      </p:sp>
-      <p:sp>
-        <p:nvSpPr>
-          <p:cNvPr id="9" name="TextBox 8"/>
-          <p:cNvSpPr txBox="1"/>
-          <p:nvPr/>
-        </p:nvSpPr>
-        <p:spPr>
-          <a:xfrm>
-            <a:off x="4023360" y="362296"/>
-            <a:ext cx="1049097" cy="369332"/>
-          </a:xfrm>
-          <a:prstGeom prst="rect">
-            <a:avLst/>
-          </a:prstGeom>
-          <a:noFill/>
-        </p:spPr>
-        <p:txBody>
-          <a:bodyPr wrap="square" rtlCol="0">
-            <a:spAutoFit/>
-          </a:bodyPr>
-          <a:lstStyle/>
-          <a:p>
-            <a:r>
-              <a:rPr lang="en-US" dirty="0" smtClean="0">
-                <a:solidFill>
-                  <a:schemeClr val="bg2"/>
+            <a:r>
+              <a:rPr lang="en-US" sz="3200" b="1" dirty="0" smtClean="0">
+                <a:solidFill>
+                  <a:srgbClr val="C00000"/>
                 </a:solidFill>
                 <a:latin typeface="Copperplate Gothic Bold" charset="0"/>
                 <a:ea typeface="Copperplate Gothic Bold" charset="0"/>
                 <a:cs typeface="Copperplate Gothic Bold" charset="0"/>
               </a:rPr>
-              <a:t>about</a:t>
-            </a:r>
-            <a:endParaRPr lang="en-US" sz="1200" dirty="0">
+              <a:t>Theta Gamma Chapter</a:t>
+            </a:r>
+          </a:p>
+          <a:p>
+            <a:pPr algn="ctr"/>
+            <a:r>
+              <a:rPr lang="en-US" sz="2000" b="1" dirty="0">
+                <a:solidFill>
+                  <a:srgbClr val="C00000"/>
+                </a:solidFill>
+                <a:latin typeface="Copperplate Gothic Bold" charset="0"/>
+                <a:ea typeface="Copperplate Gothic Bold" charset="0"/>
+                <a:cs typeface="Copperplate Gothic Bold" charset="0"/>
+              </a:rPr>
+              <a:t>t</a:t>
+            </a:r>
+            <a:r>
+              <a:rPr lang="en-US" sz="2000" b="1" dirty="0" smtClean="0">
+                <a:solidFill>
+                  <a:srgbClr val="C00000"/>
+                </a:solidFill>
+                <a:latin typeface="Copperplate Gothic Bold" charset="0"/>
+                <a:ea typeface="Copperplate Gothic Bold" charset="0"/>
+                <a:cs typeface="Copperplate Gothic Bold" charset="0"/>
+              </a:rPr>
+              <a:t>he university of michigan</a:t>
+            </a:r>
+            <a:endParaRPr lang="en-US" sz="2000" b="1" dirty="0">
               <a:solidFill>
-                <a:schemeClr val="bg2"/>
+                <a:srgbClr val="C00000"/>
               </a:solidFill>
               <a:latin typeface="Copperplate Gothic Bold" charset="0"/>
               <a:ea typeface="Copperplate Gothic Bold" charset="0"/>
@@ -3949,14 +3831,90 @@
       </p:sp>
       <p:sp>
         <p:nvSpPr>
-          <p:cNvPr id="12" name="TextBox 11"/>
+          <p:cNvPr id="21" name="TextBox 20"/>
           <p:cNvSpPr txBox="1"/>
           <p:nvPr/>
         </p:nvSpPr>
         <p:spPr>
           <a:xfrm>
-            <a:off x="5310659" y="352332"/>
-            <a:ext cx="1349221" cy="369332"/>
+            <a:off x="1744326" y="1878548"/>
+            <a:ext cx="854721" cy="2646878"/>
+          </a:xfrm>
+          <a:prstGeom prst="rect">
+            <a:avLst/>
+          </a:prstGeom>
+          <a:noFill/>
+        </p:spPr>
+        <p:txBody>
+          <a:bodyPr wrap="none" rtlCol="0">
+            <a:spAutoFit/>
+          </a:bodyPr>
+          <a:lstStyle/>
+          <a:p>
+            <a:r>
+              <a:rPr lang="en-US" sz="16600" dirty="0" smtClean="0">
+                <a:solidFill>
+                  <a:schemeClr val="bg1"/>
+                </a:solidFill>
+              </a:rPr>
+              <a:t>{</a:t>
+            </a:r>
+            <a:endParaRPr lang="en-US" dirty="0">
+              <a:solidFill>
+                <a:schemeClr val="bg1"/>
+              </a:solidFill>
+            </a:endParaRPr>
+          </a:p>
+        </p:txBody>
+      </p:sp>
+      <p:sp>
+        <p:nvSpPr>
+          <p:cNvPr id="22" name="TextBox 21"/>
+          <p:cNvSpPr txBox="1"/>
+          <p:nvPr/>
+        </p:nvSpPr>
+        <p:spPr>
+          <a:xfrm>
+            <a:off x="5508810" y="1878548"/>
+            <a:ext cx="854721" cy="2646878"/>
+          </a:xfrm>
+          <a:prstGeom prst="rect">
+            <a:avLst/>
+          </a:prstGeom>
+          <a:noFill/>
+        </p:spPr>
+        <p:txBody>
+          <a:bodyPr wrap="none" rtlCol="0">
+            <a:spAutoFit/>
+          </a:bodyPr>
+          <a:lstStyle/>
+          <a:p>
+            <a:r>
+              <a:rPr lang="en-US" sz="16600" dirty="0">
+                <a:solidFill>
+                  <a:schemeClr val="bg1"/>
+                </a:solidFill>
+              </a:rPr>
+              <a:t>}</a:t>
+            </a:r>
+            <a:endParaRPr lang="en-US" dirty="0">
+              <a:solidFill>
+                <a:schemeClr val="bg1"/>
+              </a:solidFill>
+            </a:endParaRPr>
+          </a:p>
+        </p:txBody>
+      </p:sp>
+      <p:sp>
+        <p:nvSpPr>
+          <p:cNvPr id="23" name="TextBox 22"/>
+          <p:cNvSpPr txBox="1"/>
+          <p:nvPr/>
+        </p:nvSpPr>
+        <p:spPr>
+          <a:xfrm>
+            <a:off x="2599047" y="2691893"/>
+            <a:ext cx="3214360" cy="1477328"/>
           </a:xfrm>
           <a:prstGeom prst="rect">
             <a:avLst/>
@@ -3970,133 +3928,37 @@
           <a:lstStyle/>
           <a:p>
             <a:r>
-              <a:rPr lang="en-US" smtClean="0">
-                <a:solidFill>
-                  <a:schemeClr val="bg2"/>
-                </a:solidFill>
-                <a:latin typeface="Copperplate Gothic Bold" charset="0"/>
-                <a:ea typeface="Copperplate Gothic Bold" charset="0"/>
-                <a:cs typeface="Copperplate Gothic Bold" charset="0"/>
+              <a:rPr lang="en-US" b="1" i="1" dirty="0" smtClean="0">
+                <a:latin typeface="Segoe Print" charset="0"/>
+                <a:ea typeface="Segoe Print" charset="0"/>
+                <a:cs typeface="Segoe Print" charset="0"/>
               </a:rPr>
-              <a:t>members</a:t>
-            </a:r>
-            <a:endParaRPr lang="en-US" sz="1200" dirty="0">
-              <a:solidFill>
-                <a:schemeClr val="bg2"/>
-              </a:solidFill>
-              <a:latin typeface="Copperplate Gothic Bold" charset="0"/>
-              <a:ea typeface="Copperplate Gothic Bold" charset="0"/>
-              <a:cs typeface="Copperplate Gothic Bold" charset="0"/>
+              <a:t>“Theta Tau isn’t just a fraternity…it’s a brotherhood that likes to take pictures on very frozen lakes”</a:t>
+            </a:r>
+            <a:endParaRPr lang="en-US" b="1" i="1" dirty="0">
+              <a:latin typeface="Segoe Print" charset="0"/>
+              <a:ea typeface="Segoe Print" charset="0"/>
+              <a:cs typeface="Segoe Print" charset="0"/>
             </a:endParaRPr>
           </a:p>
         </p:txBody>
       </p:sp>
       <p:sp>
         <p:nvSpPr>
-          <p:cNvPr id="13" name="TextBox 12"/>
-          <p:cNvSpPr txBox="1"/>
-          <p:nvPr/>
-        </p:nvSpPr>
-        <p:spPr>
-          <a:xfrm>
-            <a:off x="6834934" y="352332"/>
-            <a:ext cx="1349221" cy="369332"/>
-          </a:xfrm>
-          <a:prstGeom prst="rect">
-            <a:avLst/>
-          </a:prstGeom>
-          <a:noFill/>
-        </p:spPr>
-        <p:txBody>
-          <a:bodyPr wrap="square" rtlCol="0">
-            <a:spAutoFit/>
-          </a:bodyPr>
-          <a:lstStyle/>
-          <a:p>
-            <a:r>
-              <a:rPr lang="en-US" dirty="0" smtClean="0">
-                <a:solidFill>
-                  <a:schemeClr val="bg2"/>
-                </a:solidFill>
-                <a:latin typeface="Copperplate Gothic Bold" charset="0"/>
-                <a:ea typeface="Copperplate Gothic Bold" charset="0"/>
-                <a:cs typeface="Copperplate Gothic Bold" charset="0"/>
-              </a:rPr>
-              <a:t>history</a:t>
-            </a:r>
-            <a:endParaRPr lang="en-US" sz="1200" dirty="0">
-              <a:solidFill>
-                <a:schemeClr val="bg2"/>
-              </a:solidFill>
-              <a:latin typeface="Copperplate Gothic Bold" charset="0"/>
-              <a:ea typeface="Copperplate Gothic Bold" charset="0"/>
-              <a:cs typeface="Copperplate Gothic Bold" charset="0"/>
-            </a:endParaRPr>
-          </a:p>
-        </p:txBody>
-      </p:sp>
-      <p:sp>
-        <p:nvSpPr>
-          <p:cNvPr id="14" name="TextBox 13"/>
-          <p:cNvSpPr txBox="1"/>
-          <p:nvPr/>
-        </p:nvSpPr>
-        <p:spPr>
-          <a:xfrm>
-            <a:off x="8282734" y="352332"/>
-            <a:ext cx="1349221" cy="369332"/>
-          </a:xfrm>
-          <a:prstGeom prst="rect">
-            <a:avLst/>
-          </a:prstGeom>
-          <a:noFill/>
-        </p:spPr>
-        <p:txBody>
-          <a:bodyPr wrap="square" rtlCol="0">
-            <a:spAutoFit/>
-          </a:bodyPr>
-          <a:lstStyle/>
-          <a:p>
-            <a:r>
-              <a:rPr lang="en-US" dirty="0" smtClean="0">
-                <a:solidFill>
-                  <a:schemeClr val="bg2"/>
-                </a:solidFill>
-                <a:latin typeface="Copperplate Gothic Bold" charset="0"/>
-                <a:ea typeface="Copperplate Gothic Bold" charset="0"/>
-                <a:cs typeface="Copperplate Gothic Bold" charset="0"/>
-              </a:rPr>
-              <a:t>contact</a:t>
-            </a:r>
-            <a:endParaRPr lang="en-US" sz="1200" dirty="0">
-              <a:solidFill>
-                <a:schemeClr val="bg2"/>
-              </a:solidFill>
-              <a:latin typeface="Copperplate Gothic Bold" charset="0"/>
-              <a:ea typeface="Copperplate Gothic Bold" charset="0"/>
-              <a:cs typeface="Copperplate Gothic Bold" charset="0"/>
-            </a:endParaRPr>
-          </a:p>
-        </p:txBody>
-      </p:sp>
-      <p:sp>
-        <p:nvSpPr>
-          <p:cNvPr id="19" name="Rectangle 18"/>
+          <p:cNvPr id="3" name="Rectangle 2"/>
           <p:cNvSpPr/>
           <p:nvPr/>
         </p:nvSpPr>
         <p:spPr>
           <a:xfrm>
-            <a:off x="0" y="1107828"/>
-            <a:ext cx="12192000" cy="1376291"/>
+            <a:off x="0" y="-29177"/>
+            <a:ext cx="12192000" cy="476000"/>
           </a:xfrm>
           <a:prstGeom prst="rect">
             <a:avLst/>
           </a:prstGeom>
           <a:solidFill>
-            <a:schemeClr val="bg2">
-              <a:alpha val="40000"/>
-            </a:schemeClr>
+            <a:srgbClr val="C00000"/>
           </a:solidFill>
           <a:ln>
             <a:noFill/>
@@ -4123,201 +3985,143 @@
           <a:lstStyle/>
           <a:p>
             <a:pPr algn="ctr"/>
-            <a:r>
-              <a:rPr lang="en-US" sz="4000" b="1" dirty="0" smtClean="0">
-                <a:solidFill>
-                  <a:srgbClr val="C00000"/>
+            <a:endParaRPr lang="en-US"/>
+          </a:p>
+        </p:txBody>
+      </p:sp>
+      <p:pic>
+        <p:nvPicPr>
+          <p:cNvPr id="7" name="Picture 6"/>
+          <p:cNvPicPr>
+            <a:picLocks noChangeAspect="1"/>
+          </p:cNvPicPr>
+          <p:nvPr/>
+        </p:nvPicPr>
+        <p:blipFill>
+          <a:blip r:embed="rId3" cstate="screen">
+            <a:extLst>
+              <a:ext uri="{28A0092B-C50C-407E-A947-70E740481C1C}">
+                <a14:useLocalDpi xmlns:a14="http://schemas.microsoft.com/office/drawing/2010/main"/>
+              </a:ext>
+            </a:extLst>
+          </a:blip>
+          <a:stretch>
+            <a:fillRect/>
+          </a:stretch>
+        </p:blipFill>
+        <p:spPr>
+          <a:xfrm>
+            <a:off x="169325" y="25425"/>
+            <a:ext cx="200383" cy="318845"/>
+          </a:xfrm>
+          <a:prstGeom prst="rect">
+            <a:avLst/>
+          </a:prstGeom>
+        </p:spPr>
+      </p:pic>
+      <p:sp>
+        <p:nvSpPr>
+          <p:cNvPr id="8" name="TextBox 7"/>
+          <p:cNvSpPr txBox="1"/>
+          <p:nvPr/>
+        </p:nvSpPr>
+        <p:spPr>
+          <a:xfrm>
+            <a:off x="362337" y="-92117"/>
+            <a:ext cx="2574788" cy="477054"/>
+          </a:xfrm>
+          <a:prstGeom prst="rect">
+            <a:avLst/>
+          </a:prstGeom>
+          <a:noFill/>
+        </p:spPr>
+        <p:txBody>
+          <a:bodyPr wrap="square" rtlCol="0">
+            <a:spAutoFit/>
+          </a:bodyPr>
+          <a:lstStyle/>
+          <a:p>
+            <a:r>
+              <a:rPr lang="en-US" b="1" dirty="0">
+                <a:solidFill>
+                  <a:srgbClr val="FFC000"/>
+                </a:solidFill>
+                <a:latin typeface="Bodoni 72 Smallcaps Book" charset="0"/>
+                <a:ea typeface="Bodoni 72 Smallcaps Book" charset="0"/>
+                <a:cs typeface="Bodoni 72 Smallcaps Book" charset="0"/>
+              </a:rPr>
+              <a:t>t</a:t>
+            </a:r>
+            <a:r>
+              <a:rPr lang="en-US" b="1" dirty="0" smtClean="0">
+                <a:solidFill>
+                  <a:srgbClr val="FFC000"/>
+                </a:solidFill>
+                <a:latin typeface="Bodoni 72 Smallcaps Book" charset="0"/>
+                <a:ea typeface="Bodoni 72 Smallcaps Book" charset="0"/>
+                <a:cs typeface="Bodoni 72 Smallcaps Book" charset="0"/>
+              </a:rPr>
+              <a:t>heta tau</a:t>
+            </a:r>
+          </a:p>
+          <a:p>
+            <a:r>
+              <a:rPr lang="en-US" sz="700" b="1" dirty="0" smtClean="0">
+                <a:solidFill>
+                  <a:srgbClr val="FFC000"/>
+                </a:solidFill>
+                <a:latin typeface="Bodoni 72 Smallcaps Book" charset="0"/>
+                <a:ea typeface="Bodoni 72 Smallcaps Book" charset="0"/>
+                <a:cs typeface="Bodoni 72 Smallcaps Book" charset="0"/>
+              </a:rPr>
+              <a:t>PROFESSIONAL ENGINEERING FRATERNITY</a:t>
+            </a:r>
+            <a:endParaRPr lang="en-US" sz="800" b="1" dirty="0" smtClean="0">
+              <a:solidFill>
+                <a:srgbClr val="FFC000"/>
+              </a:solidFill>
+              <a:latin typeface="Bodoni 72 Smallcaps Book" charset="0"/>
+              <a:ea typeface="Bodoni 72 Smallcaps Book" charset="0"/>
+              <a:cs typeface="Bodoni 72 Smallcaps Book" charset="0"/>
+            </a:endParaRPr>
+          </a:p>
+        </p:txBody>
+      </p:sp>
+      <p:sp>
+        <p:nvSpPr>
+          <p:cNvPr id="9" name="TextBox 8"/>
+          <p:cNvSpPr txBox="1"/>
+          <p:nvPr/>
+        </p:nvSpPr>
+        <p:spPr>
+          <a:xfrm>
+            <a:off x="3738071" y="73931"/>
+            <a:ext cx="771641" cy="281281"/>
+          </a:xfrm>
+          <a:prstGeom prst="rect">
+            <a:avLst/>
+          </a:prstGeom>
+          <a:noFill/>
+        </p:spPr>
+        <p:txBody>
+          <a:bodyPr wrap="square" rtlCol="0">
+            <a:spAutoFit/>
+          </a:bodyPr>
+          <a:lstStyle/>
+          <a:p>
+            <a:pPr algn="ctr"/>
+            <a:r>
+              <a:rPr lang="en-US" sz="1200" dirty="0" smtClean="0">
+                <a:solidFill>
+                  <a:schemeClr val="bg2"/>
                 </a:solidFill>
                 <a:latin typeface="Copperplate Gothic Bold" charset="0"/>
                 <a:ea typeface="Copperplate Gothic Bold" charset="0"/>
                 <a:cs typeface="Copperplate Gothic Bold" charset="0"/>
               </a:rPr>
-              <a:t>Theta Gamma Chapter</a:t>
-            </a:r>
-          </a:p>
-          <a:p>
-            <a:pPr algn="ctr"/>
-            <a:r>
-              <a:rPr lang="en-US" sz="2400" b="1" dirty="0">
-                <a:solidFill>
-                  <a:srgbClr val="C00000"/>
-                </a:solidFill>
-                <a:latin typeface="Copperplate Gothic Bold" charset="0"/>
-                <a:ea typeface="Copperplate Gothic Bold" charset="0"/>
-                <a:cs typeface="Copperplate Gothic Bold" charset="0"/>
-              </a:rPr>
-              <a:t>t</a:t>
-            </a:r>
-            <a:r>
-              <a:rPr lang="en-US" sz="2400" b="1" dirty="0" smtClean="0">
-                <a:solidFill>
-                  <a:srgbClr val="C00000"/>
-                </a:solidFill>
-                <a:latin typeface="Copperplate Gothic Bold" charset="0"/>
-                <a:ea typeface="Copperplate Gothic Bold" charset="0"/>
-                <a:cs typeface="Copperplate Gothic Bold" charset="0"/>
-              </a:rPr>
-              <a:t>he university of michigan</a:t>
-            </a:r>
-            <a:endParaRPr lang="en-US" sz="2400" b="1" dirty="0">
-              <a:solidFill>
-                <a:srgbClr val="C00000"/>
-              </a:solidFill>
-              <a:latin typeface="Copperplate Gothic Bold" charset="0"/>
-              <a:ea typeface="Copperplate Gothic Bold" charset="0"/>
-              <a:cs typeface="Copperplate Gothic Bold" charset="0"/>
-            </a:endParaRPr>
-          </a:p>
-        </p:txBody>
-      </p:sp>
-      <p:sp>
-        <p:nvSpPr>
-          <p:cNvPr id="21" name="TextBox 20"/>
-          <p:cNvSpPr txBox="1"/>
-          <p:nvPr/>
-        </p:nvSpPr>
-        <p:spPr>
-          <a:xfrm>
-            <a:off x="609599" y="2331780"/>
-            <a:ext cx="854721" cy="2646878"/>
-          </a:xfrm>
-          <a:prstGeom prst="rect">
-            <a:avLst/>
-          </a:prstGeom>
-          <a:noFill/>
-        </p:spPr>
-        <p:txBody>
-          <a:bodyPr wrap="none" rtlCol="0">
-            <a:spAutoFit/>
-          </a:bodyPr>
-          <a:lstStyle/>
-          <a:p>
-            <a:r>
-              <a:rPr lang="en-US" sz="16600" dirty="0" smtClean="0">
-                <a:solidFill>
-                  <a:schemeClr val="bg1"/>
-                </a:solidFill>
-              </a:rPr>
-              <a:t>{</a:t>
-            </a:r>
-            <a:endParaRPr lang="en-US" dirty="0">
-              <a:solidFill>
-                <a:schemeClr val="bg1"/>
-              </a:solidFill>
-            </a:endParaRPr>
-          </a:p>
-        </p:txBody>
-      </p:sp>
-      <p:sp>
-        <p:nvSpPr>
-          <p:cNvPr id="22" name="TextBox 21"/>
-          <p:cNvSpPr txBox="1"/>
-          <p:nvPr/>
-        </p:nvSpPr>
-        <p:spPr>
-          <a:xfrm>
-            <a:off x="4374083" y="2331780"/>
-            <a:ext cx="854721" cy="2646878"/>
-          </a:xfrm>
-          <a:prstGeom prst="rect">
-            <a:avLst/>
-          </a:prstGeom>
-          <a:noFill/>
-        </p:spPr>
-        <p:txBody>
-          <a:bodyPr wrap="none" rtlCol="0">
-            <a:spAutoFit/>
-          </a:bodyPr>
-          <a:lstStyle/>
-          <a:p>
-            <a:r>
-              <a:rPr lang="en-US" sz="16600" dirty="0">
-                <a:solidFill>
-                  <a:schemeClr val="bg1"/>
-                </a:solidFill>
-              </a:rPr>
-              <a:t>}</a:t>
-            </a:r>
-            <a:endParaRPr lang="en-US" dirty="0">
-              <a:solidFill>
-                <a:schemeClr val="bg1"/>
-              </a:solidFill>
-            </a:endParaRPr>
-          </a:p>
-        </p:txBody>
-      </p:sp>
-      <p:sp>
-        <p:nvSpPr>
-          <p:cNvPr id="23" name="TextBox 22"/>
-          <p:cNvSpPr txBox="1"/>
-          <p:nvPr/>
-        </p:nvSpPr>
-        <p:spPr>
-          <a:xfrm>
-            <a:off x="1464320" y="3145125"/>
-            <a:ext cx="3214360" cy="1477328"/>
-          </a:xfrm>
-          <a:prstGeom prst="rect">
-            <a:avLst/>
-          </a:prstGeom>
-          <a:noFill/>
-        </p:spPr>
-        <p:txBody>
-          <a:bodyPr wrap="square" rtlCol="0">
-            <a:spAutoFit/>
-          </a:bodyPr>
-          <a:lstStyle/>
-          <a:p>
-            <a:r>
-              <a:rPr lang="en-US" b="1" i="1" dirty="0" smtClean="0">
-                <a:latin typeface="Segoe Print" charset="0"/>
-                <a:ea typeface="Segoe Print" charset="0"/>
-                <a:cs typeface="Segoe Print" charset="0"/>
-              </a:rPr>
-              <a:t>“Theta Tau isn’t just a fraternity…it’s a brotherhood that likes to take pictures on very frozen lakes”</a:t>
-            </a:r>
-            <a:endParaRPr lang="en-US" b="1" i="1" dirty="0">
-              <a:latin typeface="Segoe Print" charset="0"/>
-              <a:ea typeface="Segoe Print" charset="0"/>
-              <a:cs typeface="Segoe Print" charset="0"/>
-            </a:endParaRPr>
-          </a:p>
-        </p:txBody>
-      </p:sp>
-      <p:sp>
-        <p:nvSpPr>
-          <p:cNvPr id="24" name="TextBox 23"/>
-          <p:cNvSpPr txBox="1"/>
-          <p:nvPr/>
-        </p:nvSpPr>
-        <p:spPr>
-          <a:xfrm>
-            <a:off x="10967891" y="352331"/>
-            <a:ext cx="965030" cy="369332"/>
-          </a:xfrm>
-          <a:prstGeom prst="rect">
-            <a:avLst/>
-          </a:prstGeom>
-          <a:noFill/>
-        </p:spPr>
-        <p:txBody>
-          <a:bodyPr wrap="square" rtlCol="0">
-            <a:spAutoFit/>
-          </a:bodyPr>
-          <a:lstStyle/>
-          <a:p>
-            <a:r>
-              <a:rPr lang="en-US" dirty="0" smtClean="0">
-                <a:solidFill>
-                  <a:schemeClr val="bg2"/>
-                </a:solidFill>
-                <a:latin typeface="Copperplate Gothic Bold" charset="0"/>
-                <a:ea typeface="Copperplate Gothic Bold" charset="0"/>
-                <a:cs typeface="Copperplate Gothic Bold" charset="0"/>
-              </a:rPr>
-              <a:t>login</a:t>
-            </a:r>
-            <a:endParaRPr lang="en-US" sz="1200" dirty="0">
+              <a:t>about</a:t>
+            </a:r>
+            <a:endParaRPr lang="en-US" sz="1000" dirty="0">
               <a:solidFill>
                 <a:schemeClr val="bg2"/>
               </a:solidFill>
@@ -4330,14 +4134,194 @@
       </p:sp>
       <p:sp>
         <p:nvSpPr>
+          <p:cNvPr id="12" name="TextBox 11"/>
+          <p:cNvSpPr txBox="1"/>
+          <p:nvPr/>
+        </p:nvSpPr>
+        <p:spPr>
+          <a:xfrm>
+            <a:off x="4709011" y="62156"/>
+            <a:ext cx="951245" cy="277000"/>
+          </a:xfrm>
+          <a:prstGeom prst="rect">
+            <a:avLst/>
+          </a:prstGeom>
+          <a:noFill/>
+        </p:spPr>
+        <p:txBody>
+          <a:bodyPr wrap="square" rtlCol="0">
+            <a:spAutoFit/>
+          </a:bodyPr>
+          <a:lstStyle/>
+          <a:p>
+            <a:pPr algn="ctr"/>
+            <a:r>
+              <a:rPr lang="en-US" sz="1200" dirty="0" smtClean="0">
+                <a:solidFill>
+                  <a:schemeClr val="bg2"/>
+                </a:solidFill>
+                <a:latin typeface="Copperplate Gothic Bold" charset="0"/>
+                <a:ea typeface="Copperplate Gothic Bold" charset="0"/>
+                <a:cs typeface="Copperplate Gothic Bold" charset="0"/>
+              </a:rPr>
+              <a:t>members</a:t>
+            </a:r>
+            <a:endParaRPr lang="en-US" sz="1000" dirty="0">
+              <a:solidFill>
+                <a:schemeClr val="bg2"/>
+              </a:solidFill>
+              <a:latin typeface="Copperplate Gothic Bold" charset="0"/>
+              <a:ea typeface="Copperplate Gothic Bold" charset="0"/>
+              <a:cs typeface="Copperplate Gothic Bold" charset="0"/>
+            </a:endParaRPr>
+          </a:p>
+        </p:txBody>
+      </p:sp>
+      <p:sp>
+        <p:nvSpPr>
+          <p:cNvPr id="13" name="TextBox 12"/>
+          <p:cNvSpPr txBox="1"/>
+          <p:nvPr/>
+        </p:nvSpPr>
+        <p:spPr>
+          <a:xfrm>
+            <a:off x="5936171" y="69497"/>
+            <a:ext cx="920104" cy="277000"/>
+          </a:xfrm>
+          <a:prstGeom prst="rect">
+            <a:avLst/>
+          </a:prstGeom>
+          <a:noFill/>
+        </p:spPr>
+        <p:txBody>
+          <a:bodyPr wrap="square" rtlCol="0">
+            <a:spAutoFit/>
+          </a:bodyPr>
+          <a:lstStyle/>
+          <a:p>
+            <a:pPr algn="ctr"/>
+            <a:r>
+              <a:rPr lang="en-US" sz="1200" dirty="0" smtClean="0">
+                <a:solidFill>
+                  <a:schemeClr val="bg2"/>
+                </a:solidFill>
+                <a:latin typeface="Copperplate Gothic Bold" charset="0"/>
+                <a:ea typeface="Copperplate Gothic Bold" charset="0"/>
+                <a:cs typeface="Copperplate Gothic Bold" charset="0"/>
+              </a:rPr>
+              <a:t>history</a:t>
+            </a:r>
+            <a:endParaRPr lang="en-US" sz="1000" dirty="0">
+              <a:solidFill>
+                <a:schemeClr val="bg2"/>
+              </a:solidFill>
+              <a:latin typeface="Copperplate Gothic Bold" charset="0"/>
+              <a:ea typeface="Copperplate Gothic Bold" charset="0"/>
+              <a:cs typeface="Copperplate Gothic Bold" charset="0"/>
+            </a:endParaRPr>
+          </a:p>
+        </p:txBody>
+      </p:sp>
+      <p:sp>
+        <p:nvSpPr>
+          <p:cNvPr id="14" name="TextBox 13"/>
+          <p:cNvSpPr txBox="1"/>
+          <p:nvPr/>
+        </p:nvSpPr>
+        <p:spPr>
+          <a:xfrm>
+            <a:off x="7132190" y="65724"/>
+            <a:ext cx="942289" cy="277000"/>
+          </a:xfrm>
+          <a:prstGeom prst="rect">
+            <a:avLst/>
+          </a:prstGeom>
+          <a:noFill/>
+        </p:spPr>
+        <p:txBody>
+          <a:bodyPr wrap="square" rtlCol="0">
+            <a:spAutoFit/>
+          </a:bodyPr>
+          <a:lstStyle/>
+          <a:p>
+            <a:pPr algn="ctr"/>
+            <a:r>
+              <a:rPr lang="en-US" sz="1200" dirty="0" smtClean="0">
+                <a:solidFill>
+                  <a:schemeClr val="bg2"/>
+                </a:solidFill>
+                <a:latin typeface="Copperplate Gothic Bold" charset="0"/>
+                <a:ea typeface="Copperplate Gothic Bold" charset="0"/>
+                <a:cs typeface="Copperplate Gothic Bold" charset="0"/>
+              </a:rPr>
+              <a:t>contact</a:t>
+            </a:r>
+            <a:endParaRPr lang="en-US" sz="1000" dirty="0">
+              <a:solidFill>
+                <a:schemeClr val="bg2"/>
+              </a:solidFill>
+              <a:latin typeface="Copperplate Gothic Bold" charset="0"/>
+              <a:ea typeface="Copperplate Gothic Bold" charset="0"/>
+              <a:cs typeface="Copperplate Gothic Bold" charset="0"/>
+            </a:endParaRPr>
+          </a:p>
+        </p:txBody>
+      </p:sp>
+      <p:sp>
+        <p:nvSpPr>
+          <p:cNvPr id="24" name="TextBox 23"/>
+          <p:cNvSpPr txBox="1"/>
+          <p:nvPr/>
+        </p:nvSpPr>
+        <p:spPr>
+          <a:xfrm>
+            <a:off x="11259927" y="49716"/>
+            <a:ext cx="687815" cy="276999"/>
+          </a:xfrm>
+          <a:prstGeom prst="rect">
+            <a:avLst/>
+          </a:prstGeom>
+          <a:noFill/>
+        </p:spPr>
+        <p:txBody>
+          <a:bodyPr wrap="square" rtlCol="0">
+            <a:spAutoFit/>
+          </a:bodyPr>
+          <a:lstStyle/>
+          <a:p>
+            <a:pPr algn="ctr"/>
+            <a:r>
+              <a:rPr lang="en-US" sz="1200" dirty="0" smtClean="0">
+                <a:solidFill>
+                  <a:schemeClr val="bg2"/>
+                </a:solidFill>
+                <a:latin typeface="Copperplate Gothic Bold" charset="0"/>
+                <a:ea typeface="Copperplate Gothic Bold" charset="0"/>
+                <a:cs typeface="Copperplate Gothic Bold" charset="0"/>
+              </a:rPr>
+              <a:t>login</a:t>
+            </a:r>
+            <a:endParaRPr lang="en-US" sz="1000" dirty="0">
+              <a:solidFill>
+                <a:schemeClr val="bg2"/>
+              </a:solidFill>
+              <a:latin typeface="Copperplate Gothic Bold" charset="0"/>
+              <a:ea typeface="Copperplate Gothic Bold" charset="0"/>
+              <a:cs typeface="Copperplate Gothic Bold" charset="0"/>
+            </a:endParaRPr>
+          </a:p>
+        </p:txBody>
+      </p:sp>
+      <p:sp>
+        <p:nvSpPr>
           <p:cNvPr id="25" name="Rectangle 24"/>
           <p:cNvSpPr/>
           <p:nvPr/>
         </p:nvSpPr>
         <p:spPr>
           <a:xfrm>
-            <a:off x="-9530" y="1024640"/>
-            <a:ext cx="3314204" cy="76984"/>
+            <a:off x="0" y="369769"/>
+            <a:ext cx="2421467" cy="74881"/>
           </a:xfrm>
           <a:prstGeom prst="rect">
             <a:avLst/>
@@ -4382,7 +4366,7 @@
         </p:nvSpPr>
         <p:spPr>
           <a:xfrm>
-            <a:off x="5148183" y="3714275"/>
+            <a:off x="6282910" y="3261043"/>
             <a:ext cx="2356997" cy="646331"/>
           </a:xfrm>
           <a:prstGeom prst="rect">
@@ -4415,13 +4399,13 @@
       </p:sp>
       <p:sp>
         <p:nvSpPr>
-          <p:cNvPr id="2" name="TextBox 1"/>
+          <p:cNvPr id="17" name="TextBox 16"/>
           <p:cNvSpPr txBox="1"/>
           <p:nvPr/>
         </p:nvSpPr>
         <p:spPr>
           <a:xfrm>
-            <a:off x="10154654" y="1363579"/>
+            <a:off x="10277973" y="790691"/>
             <a:ext cx="1778268" cy="646331"/>
           </a:xfrm>
           <a:prstGeom prst="rect">
@@ -4449,15 +4433,15 @@
       </p:sp>
       <p:cxnSp>
         <p:nvCxnSpPr>
-          <p:cNvPr id="5" name="Straight Arrow Connector 4"/>
+          <p:cNvPr id="18" name="Straight Arrow Connector 17"/>
           <p:cNvCxnSpPr>
-            <a:stCxn id="2" idx="1"/>
+            <a:stCxn id="17" idx="1"/>
           </p:cNvCxnSpPr>
           <p:nvPr/>
         </p:nvCxnSpPr>
         <p:spPr>
           <a:xfrm flipH="1" flipV="1">
-            <a:off x="7668126" y="924950"/>
+            <a:off x="7791445" y="352062"/>
             <a:ext cx="2486528" cy="761795"/>
           </a:xfrm>
           <a:prstGeom prst="straightConnector1">
@@ -4487,7 +4471,7 @@
       </p:cxnSp>
       <p:sp>
         <p:nvSpPr>
-          <p:cNvPr id="10" name="TextBox 9"/>
+          <p:cNvPr id="20" name="TextBox 19"/>
           <p:cNvSpPr txBox="1"/>
           <p:nvPr/>
         </p:nvSpPr>
@@ -4522,13 +4506,13 @@
       </p:sp>
       <p:sp>
         <p:nvSpPr>
-          <p:cNvPr id="11" name="TextBox 10"/>
+          <p:cNvPr id="27" name="TextBox 26"/>
           <p:cNvSpPr txBox="1"/>
           <p:nvPr/>
         </p:nvSpPr>
         <p:spPr>
           <a:xfrm>
-            <a:off x="5710989" y="2630905"/>
+            <a:off x="6765095" y="1973802"/>
             <a:ext cx="2069432" cy="923330"/>
           </a:xfrm>
           <a:prstGeom prst="rect">
@@ -4552,13 +4536,13 @@
       </p:sp>
       <p:sp>
         <p:nvSpPr>
-          <p:cNvPr id="15" name="TextBox 14"/>
+          <p:cNvPr id="28" name="TextBox 27"/>
           <p:cNvSpPr txBox="1"/>
           <p:nvPr/>
         </p:nvSpPr>
         <p:spPr>
           <a:xfrm>
-            <a:off x="369708" y="1305847"/>
+            <a:off x="130924" y="990998"/>
             <a:ext cx="1277864" cy="380897"/>
           </a:xfrm>
           <a:prstGeom prst="rect">
@@ -4582,13 +4566,13 @@
       </p:sp>
       <p:sp>
         <p:nvSpPr>
-          <p:cNvPr id="16" name="TextBox 15"/>
+          <p:cNvPr id="29" name="TextBox 28"/>
           <p:cNvSpPr txBox="1"/>
           <p:nvPr/>
         </p:nvSpPr>
         <p:spPr>
           <a:xfrm>
-            <a:off x="1629829" y="1952728"/>
+            <a:off x="1845530" y="1252392"/>
             <a:ext cx="1785439" cy="1200329"/>
           </a:xfrm>
           <a:prstGeom prst="rect">
@@ -4616,15 +4600,13 @@
       </p:sp>
       <p:cxnSp>
         <p:nvCxnSpPr>
-          <p:cNvPr id="27" name="Straight Arrow Connector 26"/>
-          <p:cNvCxnSpPr>
-            <a:stCxn id="16" idx="0"/>
-          </p:cNvCxnSpPr>
+          <p:cNvPr id="30" name="Straight Arrow Connector 29"/>
+          <p:cNvCxnSpPr/>
           <p:nvPr/>
         </p:nvCxnSpPr>
         <p:spPr>
           <a:xfrm flipH="1" flipV="1">
-            <a:off x="1639360" y="1139383"/>
+            <a:off x="1855061" y="439047"/>
             <a:ext cx="883189" cy="813345"/>
           </a:xfrm>
           <a:prstGeom prst="straightConnector1">
@@ -4654,15 +4636,13 @@
       </p:cxnSp>
       <p:cxnSp>
         <p:nvCxnSpPr>
-          <p:cNvPr id="28" name="Straight Arrow Connector 27"/>
-          <p:cNvCxnSpPr>
-            <a:stCxn id="15" idx="0"/>
-          </p:cNvCxnSpPr>
+          <p:cNvPr id="31" name="Straight Arrow Connector 30"/>
+          <p:cNvCxnSpPr/>
           <p:nvPr/>
         </p:nvCxnSpPr>
         <p:spPr>
           <a:xfrm flipV="1">
-            <a:off x="1008640" y="561474"/>
+            <a:off x="769856" y="246625"/>
             <a:ext cx="274728" cy="744373"/>
           </a:xfrm>
           <a:prstGeom prst="straightConnector1">
@@ -4692,15 +4672,13 @@
       </p:cxnSp>
       <p:cxnSp>
         <p:nvCxnSpPr>
-          <p:cNvPr id="30" name="Straight Arrow Connector 29"/>
-          <p:cNvCxnSpPr>
-            <a:endCxn id="22" idx="3"/>
-          </p:cNvCxnSpPr>
+          <p:cNvPr id="32" name="Straight Arrow Connector 31"/>
+          <p:cNvCxnSpPr/>
           <p:nvPr/>
         </p:nvCxnSpPr>
         <p:spPr>
           <a:xfrm flipH="1">
-            <a:off x="5228804" y="3060556"/>
+            <a:off x="6282910" y="2403453"/>
             <a:ext cx="436495" cy="594663"/>
           </a:xfrm>
           <a:prstGeom prst="straightConnector1">
@@ -4731,7 +4709,7 @@
     </p:spTree>
     <p:extLst>
       <p:ext uri="{BB962C8B-B14F-4D97-AF65-F5344CB8AC3E}">
-        <p14:creationId xmlns:p14="http://schemas.microsoft.com/office/powerpoint/2010/main" val="664984733"/>
+        <p14:creationId xmlns:p14="http://schemas.microsoft.com/office/powerpoint/2010/main" val="1124233447"/>
       </p:ext>
     </p:extLst>
   </p:cSld>
@@ -4811,7 +4789,7 @@
         <p:spPr>
           <a:xfrm>
             <a:off x="3956858" y="0"/>
-            <a:ext cx="4339248" cy="1107831"/>
+            <a:ext cx="4339248" cy="844265"/>
           </a:xfrm>
           <a:prstGeom prst="rect">
             <a:avLst/>
@@ -4856,8 +4834,8 @@
         </p:nvSpPr>
         <p:spPr>
           <a:xfrm>
-            <a:off x="3956858" y="1107828"/>
-            <a:ext cx="4339248" cy="1046507"/>
+            <a:off x="3954340" y="846208"/>
+            <a:ext cx="4339248" cy="652964"/>
           </a:xfrm>
           <a:prstGeom prst="rect">
             <a:avLst/>
@@ -4893,7 +4871,7 @@
           <a:p>
             <a:pPr algn="ctr"/>
             <a:r>
-              <a:rPr lang="en-US" sz="2400" b="1" dirty="0" smtClean="0">
+              <a:rPr lang="en-US" sz="2000" b="1" dirty="0" smtClean="0">
                 <a:solidFill>
                   <a:srgbClr val="C00000"/>
                 </a:solidFill>
@@ -4903,7 +4881,7 @@
               </a:rPr>
               <a:t>Theta Gamma Chapter</a:t>
             </a:r>
-            <a:endParaRPr lang="en-US" sz="3600" b="1" dirty="0" smtClean="0">
+            <a:endParaRPr lang="en-US" sz="3200" b="1" dirty="0" smtClean="0">
               <a:solidFill>
                 <a:srgbClr val="C00000"/>
               </a:solidFill>
@@ -4915,7 +4893,7 @@
           <a:p>
             <a:pPr algn="ctr"/>
             <a:r>
-              <a:rPr lang="en-US" sz="1600" b="1" dirty="0">
+              <a:rPr lang="en-US" sz="1200" b="1" dirty="0">
                 <a:solidFill>
                   <a:srgbClr val="C00000"/>
                 </a:solidFill>
@@ -4926,7 +4904,7 @@
               <a:t>t</a:t>
             </a:r>
             <a:r>
-              <a:rPr lang="en-US" sz="1600" b="1" dirty="0" smtClean="0">
+              <a:rPr lang="en-US" sz="1200" b="1" dirty="0" smtClean="0">
                 <a:solidFill>
                   <a:srgbClr val="C00000"/>
                 </a:solidFill>
@@ -4936,7 +4914,7 @@
               </a:rPr>
               <a:t>he university of michigan</a:t>
             </a:r>
-            <a:endParaRPr lang="en-US" sz="1600" b="1" dirty="0">
+            <a:endParaRPr lang="en-US" sz="1200" b="1" dirty="0">
               <a:solidFill>
                 <a:srgbClr val="C00000"/>
               </a:solidFill>
@@ -5057,6 +5035,87 @@
               <a:latin typeface="Segoe Print" charset="0"/>
               <a:ea typeface="Segoe Print" charset="0"/>
               <a:cs typeface="Segoe Print" charset="0"/>
+            </a:endParaRPr>
+          </a:p>
+        </p:txBody>
+      </p:sp>
+      <p:sp>
+        <p:nvSpPr>
+          <p:cNvPr id="8" name="TextBox 7"/>
+          <p:cNvSpPr txBox="1"/>
+          <p:nvPr/>
+        </p:nvSpPr>
+        <p:spPr>
+          <a:xfrm>
+            <a:off x="4638689" y="-46404"/>
+            <a:ext cx="2242381" cy="892552"/>
+          </a:xfrm>
+          <a:prstGeom prst="rect">
+            <a:avLst/>
+          </a:prstGeom>
+          <a:noFill/>
+        </p:spPr>
+        <p:txBody>
+          <a:bodyPr wrap="square" rtlCol="0">
+            <a:spAutoFit/>
+          </a:bodyPr>
+          <a:lstStyle/>
+          <a:p>
+            <a:r>
+              <a:rPr lang="en-US" sz="2800" b="1" dirty="0">
+                <a:solidFill>
+                  <a:srgbClr val="FFC000"/>
+                </a:solidFill>
+                <a:latin typeface="Bodoni 72 Smallcaps Book" charset="0"/>
+                <a:ea typeface="Bodoni 72 Smallcaps Book" charset="0"/>
+                <a:cs typeface="Bodoni 72 Smallcaps Book" charset="0"/>
+              </a:rPr>
+              <a:t>t</a:t>
+            </a:r>
+            <a:r>
+              <a:rPr lang="en-US" sz="2800" b="1" dirty="0" smtClean="0">
+                <a:solidFill>
+                  <a:srgbClr val="FFC000"/>
+                </a:solidFill>
+                <a:latin typeface="Bodoni 72 Smallcaps Book" charset="0"/>
+                <a:ea typeface="Bodoni 72 Smallcaps Book" charset="0"/>
+                <a:cs typeface="Bodoni 72 Smallcaps Book" charset="0"/>
+              </a:rPr>
+              <a:t>heta tau</a:t>
+            </a:r>
+          </a:p>
+          <a:p>
+            <a:r>
+              <a:rPr lang="en-US" sz="1100" b="1" dirty="0" smtClean="0">
+                <a:solidFill>
+                  <a:srgbClr val="FFC000"/>
+                </a:solidFill>
+                <a:latin typeface="Bodoni 72 Smallcaps Book" charset="0"/>
+                <a:ea typeface="Bodoni 72 Smallcaps Book" charset="0"/>
+                <a:cs typeface="Bodoni 72 Smallcaps Book" charset="0"/>
+              </a:rPr>
+              <a:t>PROFESSIONAL ENGINEERING </a:t>
+            </a:r>
+          </a:p>
+          <a:p>
+            <a:r>
+              <a:rPr lang="en-US" sz="1100" b="1" dirty="0" smtClean="0">
+                <a:solidFill>
+                  <a:srgbClr val="FFC000"/>
+                </a:solidFill>
+                <a:latin typeface="Bodoni 72 Smallcaps Book" charset="0"/>
+                <a:ea typeface="Bodoni 72 Smallcaps Book" charset="0"/>
+                <a:cs typeface="Bodoni 72 Smallcaps Book" charset="0"/>
+              </a:rPr>
+              <a:t>FRATERNITY</a:t>
+            </a:r>
+            <a:endParaRPr lang="en-US" sz="1200" b="1" dirty="0" smtClean="0">
+              <a:solidFill>
+                <a:srgbClr val="FFC000"/>
+              </a:solidFill>
+              <a:latin typeface="Bodoni 72 Smallcaps Book" charset="0"/>
+              <a:ea typeface="Bodoni 72 Smallcaps Book" charset="0"/>
+              <a:cs typeface="Bodoni 72 Smallcaps Book" charset="0"/>
             </a:endParaRPr>
           </a:p>
         </p:txBody>
@@ -5083,8 +5142,8 @@
         </p:blipFill>
         <p:spPr>
           <a:xfrm>
-            <a:off x="4088078" y="188315"/>
-            <a:ext cx="451798" cy="742071"/>
+            <a:off x="4083150" y="71809"/>
+            <a:ext cx="439655" cy="722131"/>
           </a:xfrm>
           <a:prstGeom prst="rect">
             <a:avLst/>
@@ -5130,87 +5189,6 @@
           </a:p>
         </p:txBody>
       </p:sp>
-      <p:sp>
-        <p:nvSpPr>
-          <p:cNvPr id="8" name="TextBox 7"/>
-          <p:cNvSpPr txBox="1"/>
-          <p:nvPr/>
-        </p:nvSpPr>
-        <p:spPr>
-          <a:xfrm>
-            <a:off x="4586663" y="-45724"/>
-            <a:ext cx="4678680" cy="1077218"/>
-          </a:xfrm>
-          <a:prstGeom prst="rect">
-            <a:avLst/>
-          </a:prstGeom>
-          <a:noFill/>
-        </p:spPr>
-        <p:txBody>
-          <a:bodyPr wrap="square" rtlCol="0">
-            <a:spAutoFit/>
-          </a:bodyPr>
-          <a:lstStyle/>
-          <a:p>
-            <a:r>
-              <a:rPr lang="en-US" sz="3600" b="1" dirty="0">
-                <a:solidFill>
-                  <a:srgbClr val="FFC000"/>
-                </a:solidFill>
-                <a:latin typeface="Bodoni 72 Smallcaps Book" charset="0"/>
-                <a:ea typeface="Bodoni 72 Smallcaps Book" charset="0"/>
-                <a:cs typeface="Bodoni 72 Smallcaps Book" charset="0"/>
-              </a:rPr>
-              <a:t>t</a:t>
-            </a:r>
-            <a:r>
-              <a:rPr lang="en-US" sz="3600" b="1" dirty="0" smtClean="0">
-                <a:solidFill>
-                  <a:srgbClr val="FFC000"/>
-                </a:solidFill>
-                <a:latin typeface="Bodoni 72 Smallcaps Book" charset="0"/>
-                <a:ea typeface="Bodoni 72 Smallcaps Book" charset="0"/>
-                <a:cs typeface="Bodoni 72 Smallcaps Book" charset="0"/>
-              </a:rPr>
-              <a:t>heta tau</a:t>
-            </a:r>
-          </a:p>
-          <a:p>
-            <a:r>
-              <a:rPr lang="en-US" sz="1400" b="1" dirty="0" smtClean="0">
-                <a:solidFill>
-                  <a:srgbClr val="FFC000"/>
-                </a:solidFill>
-                <a:latin typeface="Bodoni 72 Smallcaps Book" charset="0"/>
-                <a:ea typeface="Bodoni 72 Smallcaps Book" charset="0"/>
-                <a:cs typeface="Bodoni 72 Smallcaps Book" charset="0"/>
-              </a:rPr>
-              <a:t>PROFESSIONAL ENGINEERING </a:t>
-            </a:r>
-          </a:p>
-          <a:p>
-            <a:r>
-              <a:rPr lang="en-US" sz="1400" b="1" dirty="0" smtClean="0">
-                <a:solidFill>
-                  <a:srgbClr val="FFC000"/>
-                </a:solidFill>
-                <a:latin typeface="Bodoni 72 Smallcaps Book" charset="0"/>
-                <a:ea typeface="Bodoni 72 Smallcaps Book" charset="0"/>
-                <a:cs typeface="Bodoni 72 Smallcaps Book" charset="0"/>
-              </a:rPr>
-              <a:t>FRATERNITY</a:t>
-            </a:r>
-            <a:endParaRPr lang="en-US" sz="1600" b="1" dirty="0" smtClean="0">
-              <a:solidFill>
-                <a:srgbClr val="FFC000"/>
-              </a:solidFill>
-              <a:latin typeface="Bodoni 72 Smallcaps Book" charset="0"/>
-              <a:ea typeface="Bodoni 72 Smallcaps Book" charset="0"/>
-              <a:cs typeface="Bodoni 72 Smallcaps Book" charset="0"/>
-            </a:endParaRPr>
-          </a:p>
-        </p:txBody>
-      </p:sp>
       <p:grpSp>
         <p:nvGrpSpPr>
           <p:cNvPr id="5" name="Group 4"/>
@@ -5219,8 +5197,8 @@
         </p:nvGrpSpPr>
         <p:grpSpPr>
           <a:xfrm>
-            <a:off x="7509356" y="365761"/>
-            <a:ext cx="470300" cy="385582"/>
+            <a:off x="7583723" y="257178"/>
+            <a:ext cx="360126" cy="300036"/>
             <a:chOff x="7684168" y="368969"/>
             <a:chExt cx="481264" cy="447283"/>
           </a:xfrm>
@@ -5453,7 +5431,7 @@
         <p:spPr>
           <a:xfrm>
             <a:off x="3956858" y="0"/>
-            <a:ext cx="4339248" cy="1107831"/>
+            <a:ext cx="4339248" cy="844265"/>
           </a:xfrm>
           <a:prstGeom prst="rect">
             <a:avLst/>
@@ -5498,8 +5476,8 @@
         </p:nvSpPr>
         <p:spPr>
           <a:xfrm>
-            <a:off x="3956858" y="1107828"/>
-            <a:ext cx="4339248" cy="1046507"/>
+            <a:off x="3954340" y="846208"/>
+            <a:ext cx="4339248" cy="652964"/>
           </a:xfrm>
           <a:prstGeom prst="rect">
             <a:avLst/>
@@ -5535,7 +5513,7 @@
           <a:p>
             <a:pPr algn="ctr"/>
             <a:r>
-              <a:rPr lang="en-US" sz="2400" b="1" dirty="0" smtClean="0">
+              <a:rPr lang="en-US" sz="2000" b="1" dirty="0" smtClean="0">
                 <a:solidFill>
                   <a:srgbClr val="C00000"/>
                 </a:solidFill>
@@ -5545,7 +5523,7 @@
               </a:rPr>
               <a:t>Theta Gamma Chapter</a:t>
             </a:r>
-            <a:endParaRPr lang="en-US" sz="3600" b="1" dirty="0" smtClean="0">
+            <a:endParaRPr lang="en-US" sz="3200" b="1" dirty="0" smtClean="0">
               <a:solidFill>
                 <a:srgbClr val="C00000"/>
               </a:solidFill>
@@ -5557,7 +5535,7 @@
           <a:p>
             <a:pPr algn="ctr"/>
             <a:r>
-              <a:rPr lang="en-US" sz="1600" b="1" dirty="0">
+              <a:rPr lang="en-US" sz="1200" b="1" dirty="0">
                 <a:solidFill>
                   <a:srgbClr val="C00000"/>
                 </a:solidFill>
@@ -5568,7 +5546,7 @@
               <a:t>t</a:t>
             </a:r>
             <a:r>
-              <a:rPr lang="en-US" sz="1600" b="1" dirty="0" smtClean="0">
+              <a:rPr lang="en-US" sz="1200" b="1" dirty="0" smtClean="0">
                 <a:solidFill>
                   <a:srgbClr val="C00000"/>
                 </a:solidFill>
@@ -5578,7 +5556,7 @@
               </a:rPr>
               <a:t>he university of michigan</a:t>
             </a:r>
-            <a:endParaRPr lang="en-US" sz="1600" b="1" dirty="0">
+            <a:endParaRPr lang="en-US" sz="1200" b="1" dirty="0">
               <a:solidFill>
                 <a:srgbClr val="C00000"/>
               </a:solidFill>
@@ -5699,6 +5677,87 @@
               <a:latin typeface="Segoe Print" charset="0"/>
               <a:ea typeface="Segoe Print" charset="0"/>
               <a:cs typeface="Segoe Print" charset="0"/>
+            </a:endParaRPr>
+          </a:p>
+        </p:txBody>
+      </p:sp>
+      <p:sp>
+        <p:nvSpPr>
+          <p:cNvPr id="8" name="TextBox 7"/>
+          <p:cNvSpPr txBox="1"/>
+          <p:nvPr/>
+        </p:nvSpPr>
+        <p:spPr>
+          <a:xfrm>
+            <a:off x="4638689" y="-46404"/>
+            <a:ext cx="2242381" cy="892552"/>
+          </a:xfrm>
+          <a:prstGeom prst="rect">
+            <a:avLst/>
+          </a:prstGeom>
+          <a:noFill/>
+        </p:spPr>
+        <p:txBody>
+          <a:bodyPr wrap="square" rtlCol="0">
+            <a:spAutoFit/>
+          </a:bodyPr>
+          <a:lstStyle/>
+          <a:p>
+            <a:r>
+              <a:rPr lang="en-US" sz="2800" b="1" dirty="0">
+                <a:solidFill>
+                  <a:srgbClr val="FFC000"/>
+                </a:solidFill>
+                <a:latin typeface="Bodoni 72 Smallcaps Book" charset="0"/>
+                <a:ea typeface="Bodoni 72 Smallcaps Book" charset="0"/>
+                <a:cs typeface="Bodoni 72 Smallcaps Book" charset="0"/>
+              </a:rPr>
+              <a:t>t</a:t>
+            </a:r>
+            <a:r>
+              <a:rPr lang="en-US" sz="2800" b="1" dirty="0" smtClean="0">
+                <a:solidFill>
+                  <a:srgbClr val="FFC000"/>
+                </a:solidFill>
+                <a:latin typeface="Bodoni 72 Smallcaps Book" charset="0"/>
+                <a:ea typeface="Bodoni 72 Smallcaps Book" charset="0"/>
+                <a:cs typeface="Bodoni 72 Smallcaps Book" charset="0"/>
+              </a:rPr>
+              <a:t>heta tau</a:t>
+            </a:r>
+          </a:p>
+          <a:p>
+            <a:r>
+              <a:rPr lang="en-US" sz="1100" b="1" dirty="0" smtClean="0">
+                <a:solidFill>
+                  <a:srgbClr val="FFC000"/>
+                </a:solidFill>
+                <a:latin typeface="Bodoni 72 Smallcaps Book" charset="0"/>
+                <a:ea typeface="Bodoni 72 Smallcaps Book" charset="0"/>
+                <a:cs typeface="Bodoni 72 Smallcaps Book" charset="0"/>
+              </a:rPr>
+              <a:t>PROFESSIONAL ENGINEERING </a:t>
+            </a:r>
+          </a:p>
+          <a:p>
+            <a:r>
+              <a:rPr lang="en-US" sz="1100" b="1" dirty="0" smtClean="0">
+                <a:solidFill>
+                  <a:srgbClr val="FFC000"/>
+                </a:solidFill>
+                <a:latin typeface="Bodoni 72 Smallcaps Book" charset="0"/>
+                <a:ea typeface="Bodoni 72 Smallcaps Book" charset="0"/>
+                <a:cs typeface="Bodoni 72 Smallcaps Book" charset="0"/>
+              </a:rPr>
+              <a:t>FRATERNITY</a:t>
+            </a:r>
+            <a:endParaRPr lang="en-US" sz="1200" b="1" dirty="0" smtClean="0">
+              <a:solidFill>
+                <a:srgbClr val="FFC000"/>
+              </a:solidFill>
+              <a:latin typeface="Bodoni 72 Smallcaps Book" charset="0"/>
+              <a:ea typeface="Bodoni 72 Smallcaps Book" charset="0"/>
+              <a:cs typeface="Bodoni 72 Smallcaps Book" charset="0"/>
             </a:endParaRPr>
           </a:p>
         </p:txBody>
@@ -5725,8 +5784,8 @@
         </p:blipFill>
         <p:spPr>
           <a:xfrm>
-            <a:off x="4088078" y="188315"/>
-            <a:ext cx="451798" cy="742071"/>
+            <a:off x="4083150" y="71809"/>
+            <a:ext cx="439655" cy="722131"/>
           </a:xfrm>
           <a:prstGeom prst="rect">
             <a:avLst/>
@@ -5772,87 +5831,6 @@
           </a:p>
         </p:txBody>
       </p:sp>
-      <p:sp>
-        <p:nvSpPr>
-          <p:cNvPr id="8" name="TextBox 7"/>
-          <p:cNvSpPr txBox="1"/>
-          <p:nvPr/>
-        </p:nvSpPr>
-        <p:spPr>
-          <a:xfrm>
-            <a:off x="4586663" y="-45724"/>
-            <a:ext cx="4678680" cy="1077218"/>
-          </a:xfrm>
-          <a:prstGeom prst="rect">
-            <a:avLst/>
-          </a:prstGeom>
-          <a:noFill/>
-        </p:spPr>
-        <p:txBody>
-          <a:bodyPr wrap="square" rtlCol="0">
-            <a:spAutoFit/>
-          </a:bodyPr>
-          <a:lstStyle/>
-          <a:p>
-            <a:r>
-              <a:rPr lang="en-US" sz="3600" b="1" dirty="0">
-                <a:solidFill>
-                  <a:srgbClr val="FFC000"/>
-                </a:solidFill>
-                <a:latin typeface="Bodoni 72 Smallcaps Book" charset="0"/>
-                <a:ea typeface="Bodoni 72 Smallcaps Book" charset="0"/>
-                <a:cs typeface="Bodoni 72 Smallcaps Book" charset="0"/>
-              </a:rPr>
-              <a:t>t</a:t>
-            </a:r>
-            <a:r>
-              <a:rPr lang="en-US" sz="3600" b="1" dirty="0" smtClean="0">
-                <a:solidFill>
-                  <a:srgbClr val="FFC000"/>
-                </a:solidFill>
-                <a:latin typeface="Bodoni 72 Smallcaps Book" charset="0"/>
-                <a:ea typeface="Bodoni 72 Smallcaps Book" charset="0"/>
-                <a:cs typeface="Bodoni 72 Smallcaps Book" charset="0"/>
-              </a:rPr>
-              <a:t>heta tau</a:t>
-            </a:r>
-          </a:p>
-          <a:p>
-            <a:r>
-              <a:rPr lang="en-US" sz="1400" b="1" dirty="0" smtClean="0">
-                <a:solidFill>
-                  <a:srgbClr val="FFC000"/>
-                </a:solidFill>
-                <a:latin typeface="Bodoni 72 Smallcaps Book" charset="0"/>
-                <a:ea typeface="Bodoni 72 Smallcaps Book" charset="0"/>
-                <a:cs typeface="Bodoni 72 Smallcaps Book" charset="0"/>
-              </a:rPr>
-              <a:t>PROFESSIONAL ENGINEERING </a:t>
-            </a:r>
-          </a:p>
-          <a:p>
-            <a:r>
-              <a:rPr lang="en-US" sz="1400" b="1" dirty="0" smtClean="0">
-                <a:solidFill>
-                  <a:srgbClr val="FFC000"/>
-                </a:solidFill>
-                <a:latin typeface="Bodoni 72 Smallcaps Book" charset="0"/>
-                <a:ea typeface="Bodoni 72 Smallcaps Book" charset="0"/>
-                <a:cs typeface="Bodoni 72 Smallcaps Book" charset="0"/>
-              </a:rPr>
-              <a:t>FRATERNITY</a:t>
-            </a:r>
-            <a:endParaRPr lang="en-US" sz="1600" b="1" dirty="0" smtClean="0">
-              <a:solidFill>
-                <a:srgbClr val="FFC000"/>
-              </a:solidFill>
-              <a:latin typeface="Bodoni 72 Smallcaps Book" charset="0"/>
-              <a:ea typeface="Bodoni 72 Smallcaps Book" charset="0"/>
-              <a:cs typeface="Bodoni 72 Smallcaps Book" charset="0"/>
-            </a:endParaRPr>
-          </a:p>
-        </p:txBody>
-      </p:sp>
       <p:grpSp>
         <p:nvGrpSpPr>
           <p:cNvPr id="5" name="Group 4"/>
@@ -5861,8 +5839,8 @@
         </p:nvGrpSpPr>
         <p:grpSpPr>
           <a:xfrm>
-            <a:off x="7509356" y="365761"/>
-            <a:ext cx="470300" cy="385582"/>
+            <a:off x="7583723" y="257178"/>
+            <a:ext cx="360126" cy="300036"/>
             <a:chOff x="7684168" y="368969"/>
             <a:chExt cx="481264" cy="447283"/>
           </a:xfrm>
@@ -6014,7 +5992,7 @@
       </p:grpSp>
       <p:sp>
         <p:nvSpPr>
-          <p:cNvPr id="2" name="TextBox 1"/>
+          <p:cNvPr id="15" name="TextBox 14"/>
           <p:cNvSpPr txBox="1"/>
           <p:nvPr/>
         </p:nvSpPr>
@@ -6128,7 +6106,7 @@
       </p:sp>
       <p:cxnSp>
         <p:nvCxnSpPr>
-          <p:cNvPr id="10" name="Straight Arrow Connector 9"/>
+          <p:cNvPr id="18" name="Straight Arrow Connector 17"/>
           <p:cNvCxnSpPr/>
           <p:nvPr/>
         </p:nvCxnSpPr>
@@ -6164,10 +6142,8 @@
       </p:cxnSp>
       <p:cxnSp>
         <p:nvCxnSpPr>
-          <p:cNvPr id="12" name="Straight Arrow Connector 11"/>
-          <p:cNvCxnSpPr>
-            <a:stCxn id="16" idx="1"/>
-          </p:cNvCxnSpPr>
+          <p:cNvPr id="24" name="Straight Arrow Connector 23"/>
+          <p:cNvCxnSpPr/>
           <p:nvPr/>
         </p:nvCxnSpPr>
         <p:spPr>
@@ -6202,10 +6178,8 @@
       </p:cxnSp>
       <p:cxnSp>
         <p:nvCxnSpPr>
-          <p:cNvPr id="15" name="Straight Arrow Connector 14"/>
-          <p:cNvCxnSpPr>
-            <a:stCxn id="17" idx="2"/>
-          </p:cNvCxnSpPr>
+          <p:cNvPr id="25" name="Straight Arrow Connector 24"/>
+          <p:cNvCxnSpPr/>
           <p:nvPr/>
         </p:nvCxnSpPr>
         <p:spPr>
@@ -6241,7 +6215,7 @@
     </p:spTree>
     <p:extLst>
       <p:ext uri="{BB962C8B-B14F-4D97-AF65-F5344CB8AC3E}">
-        <p14:creationId xmlns:p14="http://schemas.microsoft.com/office/powerpoint/2010/main" val="117955278"/>
+        <p14:creationId xmlns:p14="http://schemas.microsoft.com/office/powerpoint/2010/main" val="2134387494"/>
       </p:ext>
     </p:extLst>
   </p:cSld>
@@ -6314,20 +6288,22 @@
       </p:pic>
       <p:sp>
         <p:nvSpPr>
-          <p:cNvPr id="3" name="Rectangle 2"/>
+          <p:cNvPr id="19" name="Rectangle 18"/>
           <p:cNvSpPr/>
           <p:nvPr/>
         </p:nvSpPr>
         <p:spPr>
           <a:xfrm>
-            <a:off x="0" y="0"/>
-            <a:ext cx="12192000" cy="1107831"/>
+            <a:off x="0" y="447655"/>
+            <a:ext cx="12192000" cy="1376291"/>
           </a:xfrm>
           <a:prstGeom prst="rect">
             <a:avLst/>
           </a:prstGeom>
           <a:solidFill>
-            <a:srgbClr val="C00000"/>
+            <a:schemeClr val="bg2">
+              <a:alpha val="40000"/>
+            </a:schemeClr>
           </a:solidFill>
           <a:ln>
             <a:noFill/>
@@ -6354,157 +6330,45 @@
           <a:lstStyle/>
           <a:p>
             <a:pPr algn="ctr"/>
-            <a:endParaRPr lang="en-US"/>
-          </a:p>
-        </p:txBody>
-      </p:sp>
-      <p:pic>
-        <p:nvPicPr>
-          <p:cNvPr id="7" name="Picture 6"/>
-          <p:cNvPicPr>
-            <a:picLocks noChangeAspect="1"/>
-          </p:cNvPicPr>
-          <p:nvPr/>
-        </p:nvPicPr>
-        <p:blipFill>
-          <a:blip r:embed="rId3" cstate="screen">
-            <a:extLst>
-              <a:ext uri="{28A0092B-C50C-407E-A947-70E740481C1C}">
-                <a14:useLocalDpi xmlns:a14="http://schemas.microsoft.com/office/drawing/2010/main"/>
-              </a:ext>
-            </a:extLst>
-          </a:blip>
-          <a:stretch>
-            <a:fillRect/>
-          </a:stretch>
-        </p:blipFill>
-        <p:spPr>
-          <a:xfrm>
-            <a:off x="129817" y="182879"/>
-            <a:ext cx="479782" cy="742071"/>
-          </a:xfrm>
-          <a:prstGeom prst="rect">
-            <a:avLst/>
-          </a:prstGeom>
-        </p:spPr>
-      </p:pic>
-      <p:sp>
-        <p:nvSpPr>
-          <p:cNvPr id="8" name="TextBox 7"/>
-          <p:cNvSpPr txBox="1"/>
-          <p:nvPr/>
-        </p:nvSpPr>
-        <p:spPr>
-          <a:xfrm>
-            <a:off x="739416" y="-51160"/>
-            <a:ext cx="4678680" cy="1077218"/>
-          </a:xfrm>
-          <a:prstGeom prst="rect">
-            <a:avLst/>
-          </a:prstGeom>
-          <a:noFill/>
-        </p:spPr>
-        <p:txBody>
-          <a:bodyPr wrap="square" rtlCol="0">
-            <a:spAutoFit/>
-          </a:bodyPr>
-          <a:lstStyle/>
-          <a:p>
-            <a:r>
-              <a:rPr lang="en-US" sz="3600" b="1" dirty="0">
-                <a:solidFill>
-                  <a:srgbClr val="FFC000"/>
-                </a:solidFill>
-                <a:latin typeface="Bodoni 72 Smallcaps Book" charset="0"/>
-                <a:ea typeface="Bodoni 72 Smallcaps Book" charset="0"/>
-                <a:cs typeface="Bodoni 72 Smallcaps Book" charset="0"/>
-              </a:rPr>
-              <a:t>t</a:t>
-            </a:r>
-            <a:r>
-              <a:rPr lang="en-US" sz="3600" b="1" dirty="0" smtClean="0">
-                <a:solidFill>
-                  <a:srgbClr val="FFC000"/>
-                </a:solidFill>
-                <a:latin typeface="Bodoni 72 Smallcaps Book" charset="0"/>
-                <a:ea typeface="Bodoni 72 Smallcaps Book" charset="0"/>
-                <a:cs typeface="Bodoni 72 Smallcaps Book" charset="0"/>
-              </a:rPr>
-              <a:t>heta tau</a:t>
-            </a:r>
-          </a:p>
-          <a:p>
-            <a:r>
-              <a:rPr lang="en-US" sz="1400" b="1" dirty="0" smtClean="0">
-                <a:solidFill>
-                  <a:srgbClr val="FFC000"/>
-                </a:solidFill>
-                <a:latin typeface="Bodoni 72 Smallcaps Book" charset="0"/>
-                <a:ea typeface="Bodoni 72 Smallcaps Book" charset="0"/>
-                <a:cs typeface="Bodoni 72 Smallcaps Book" charset="0"/>
-              </a:rPr>
-              <a:t>PROFESSIONAL ENGINEERING </a:t>
-            </a:r>
-          </a:p>
-          <a:p>
-            <a:r>
-              <a:rPr lang="en-US" sz="1400" b="1" dirty="0" smtClean="0">
-                <a:solidFill>
-                  <a:srgbClr val="FFC000"/>
-                </a:solidFill>
-                <a:latin typeface="Bodoni 72 Smallcaps Book" charset="0"/>
-                <a:ea typeface="Bodoni 72 Smallcaps Book" charset="0"/>
-                <a:cs typeface="Bodoni 72 Smallcaps Book" charset="0"/>
-              </a:rPr>
-              <a:t>FRATERNITY</a:t>
-            </a:r>
-            <a:endParaRPr lang="en-US" sz="1600" b="1" dirty="0" smtClean="0">
-              <a:solidFill>
-                <a:srgbClr val="FFC000"/>
-              </a:solidFill>
-              <a:latin typeface="Bodoni 72 Smallcaps Book" charset="0"/>
-              <a:ea typeface="Bodoni 72 Smallcaps Book" charset="0"/>
-              <a:cs typeface="Bodoni 72 Smallcaps Book" charset="0"/>
-            </a:endParaRPr>
-          </a:p>
-        </p:txBody>
-      </p:sp>
-      <p:sp>
-        <p:nvSpPr>
-          <p:cNvPr id="9" name="TextBox 8"/>
-          <p:cNvSpPr txBox="1"/>
-          <p:nvPr/>
-        </p:nvSpPr>
-        <p:spPr>
-          <a:xfrm>
-            <a:off x="4023360" y="362296"/>
-            <a:ext cx="1049097" cy="369332"/>
-          </a:xfrm>
-          <a:prstGeom prst="rect">
-            <a:avLst/>
-          </a:prstGeom>
-          <a:noFill/>
-        </p:spPr>
-        <p:txBody>
-          <a:bodyPr wrap="square" rtlCol="0">
-            <a:spAutoFit/>
-          </a:bodyPr>
-          <a:lstStyle/>
-          <a:p>
-            <a:r>
-              <a:rPr lang="en-US" dirty="0" smtClean="0">
-                <a:solidFill>
-                  <a:schemeClr val="bg2"/>
+            <a:r>
+              <a:rPr lang="en-US" sz="3200" b="1" dirty="0" smtClean="0">
+                <a:solidFill>
+                  <a:srgbClr val="C00000"/>
                 </a:solidFill>
                 <a:latin typeface="Copperplate Gothic Bold" charset="0"/>
                 <a:ea typeface="Copperplate Gothic Bold" charset="0"/>
                 <a:cs typeface="Copperplate Gothic Bold" charset="0"/>
               </a:rPr>
-              <a:t>about</a:t>
-            </a:r>
-            <a:endParaRPr lang="en-US" sz="1200" dirty="0">
+              <a:t>Theta Gamma Chapter</a:t>
+            </a:r>
+          </a:p>
+          <a:p>
+            <a:pPr algn="ctr"/>
+            <a:r>
+              <a:rPr lang="en-US" sz="2000" b="1" dirty="0">
+                <a:solidFill>
+                  <a:srgbClr val="C00000"/>
+                </a:solidFill>
+                <a:latin typeface="Copperplate Gothic Bold" charset="0"/>
+                <a:ea typeface="Copperplate Gothic Bold" charset="0"/>
+                <a:cs typeface="Copperplate Gothic Bold" charset="0"/>
+              </a:rPr>
+              <a:t>t</a:t>
+            </a:r>
+            <a:r>
+              <a:rPr lang="en-US" sz="2000" b="1" dirty="0" smtClean="0">
+                <a:solidFill>
+                  <a:srgbClr val="C00000"/>
+                </a:solidFill>
+                <a:latin typeface="Copperplate Gothic Bold" charset="0"/>
+                <a:ea typeface="Copperplate Gothic Bold" charset="0"/>
+                <a:cs typeface="Copperplate Gothic Bold" charset="0"/>
+              </a:rPr>
+              <a:t>he university of michigan</a:t>
+            </a:r>
+            <a:endParaRPr lang="en-US" sz="2000" b="1" dirty="0">
               <a:solidFill>
-                <a:schemeClr val="bg2"/>
+                <a:srgbClr val="C00000"/>
               </a:solidFill>
               <a:latin typeface="Copperplate Gothic Bold" charset="0"/>
               <a:ea typeface="Copperplate Gothic Bold" charset="0"/>
@@ -6515,14 +6379,90 @@
       </p:sp>
       <p:sp>
         <p:nvSpPr>
-          <p:cNvPr id="12" name="TextBox 11"/>
+          <p:cNvPr id="21" name="TextBox 20"/>
           <p:cNvSpPr txBox="1"/>
           <p:nvPr/>
         </p:nvSpPr>
         <p:spPr>
           <a:xfrm>
-            <a:off x="5310659" y="352332"/>
-            <a:ext cx="1349221" cy="369332"/>
+            <a:off x="1744326" y="1878548"/>
+            <a:ext cx="854721" cy="2646878"/>
+          </a:xfrm>
+          <a:prstGeom prst="rect">
+            <a:avLst/>
+          </a:prstGeom>
+          <a:noFill/>
+        </p:spPr>
+        <p:txBody>
+          <a:bodyPr wrap="none" rtlCol="0">
+            <a:spAutoFit/>
+          </a:bodyPr>
+          <a:lstStyle/>
+          <a:p>
+            <a:r>
+              <a:rPr lang="en-US" sz="16600" dirty="0" smtClean="0">
+                <a:solidFill>
+                  <a:schemeClr val="bg1"/>
+                </a:solidFill>
+              </a:rPr>
+              <a:t>{</a:t>
+            </a:r>
+            <a:endParaRPr lang="en-US" dirty="0">
+              <a:solidFill>
+                <a:schemeClr val="bg1"/>
+              </a:solidFill>
+            </a:endParaRPr>
+          </a:p>
+        </p:txBody>
+      </p:sp>
+      <p:sp>
+        <p:nvSpPr>
+          <p:cNvPr id="22" name="TextBox 21"/>
+          <p:cNvSpPr txBox="1"/>
+          <p:nvPr/>
+        </p:nvSpPr>
+        <p:spPr>
+          <a:xfrm>
+            <a:off x="5508810" y="1878548"/>
+            <a:ext cx="854721" cy="2646878"/>
+          </a:xfrm>
+          <a:prstGeom prst="rect">
+            <a:avLst/>
+          </a:prstGeom>
+          <a:noFill/>
+        </p:spPr>
+        <p:txBody>
+          <a:bodyPr wrap="none" rtlCol="0">
+            <a:spAutoFit/>
+          </a:bodyPr>
+          <a:lstStyle/>
+          <a:p>
+            <a:r>
+              <a:rPr lang="en-US" sz="16600" dirty="0">
+                <a:solidFill>
+                  <a:schemeClr val="bg1"/>
+                </a:solidFill>
+              </a:rPr>
+              <a:t>}</a:t>
+            </a:r>
+            <a:endParaRPr lang="en-US" dirty="0">
+              <a:solidFill>
+                <a:schemeClr val="bg1"/>
+              </a:solidFill>
+            </a:endParaRPr>
+          </a:p>
+        </p:txBody>
+      </p:sp>
+      <p:sp>
+        <p:nvSpPr>
+          <p:cNvPr id="23" name="TextBox 22"/>
+          <p:cNvSpPr txBox="1"/>
+          <p:nvPr/>
+        </p:nvSpPr>
+        <p:spPr>
+          <a:xfrm>
+            <a:off x="2599047" y="2691893"/>
+            <a:ext cx="3214360" cy="1477328"/>
           </a:xfrm>
           <a:prstGeom prst="rect">
             <a:avLst/>
@@ -6536,133 +6476,37 @@
           <a:lstStyle/>
           <a:p>
             <a:r>
-              <a:rPr lang="en-US" smtClean="0">
-                <a:solidFill>
-                  <a:schemeClr val="bg2"/>
-                </a:solidFill>
-                <a:latin typeface="Copperplate Gothic Bold" charset="0"/>
-                <a:ea typeface="Copperplate Gothic Bold" charset="0"/>
-                <a:cs typeface="Copperplate Gothic Bold" charset="0"/>
+              <a:rPr lang="en-US" b="1" i="1" dirty="0" smtClean="0">
+                <a:latin typeface="Segoe Print" charset="0"/>
+                <a:ea typeface="Segoe Print" charset="0"/>
+                <a:cs typeface="Segoe Print" charset="0"/>
               </a:rPr>
-              <a:t>members</a:t>
-            </a:r>
-            <a:endParaRPr lang="en-US" sz="1200" dirty="0">
-              <a:solidFill>
-                <a:schemeClr val="bg2"/>
-              </a:solidFill>
-              <a:latin typeface="Copperplate Gothic Bold" charset="0"/>
-              <a:ea typeface="Copperplate Gothic Bold" charset="0"/>
-              <a:cs typeface="Copperplate Gothic Bold" charset="0"/>
+              <a:t>“Theta Tau isn’t just a fraternity…it’s a brotherhood that likes to take pictures on very frozen lakes”</a:t>
+            </a:r>
+            <a:endParaRPr lang="en-US" b="1" i="1" dirty="0">
+              <a:latin typeface="Segoe Print" charset="0"/>
+              <a:ea typeface="Segoe Print" charset="0"/>
+              <a:cs typeface="Segoe Print" charset="0"/>
             </a:endParaRPr>
           </a:p>
         </p:txBody>
       </p:sp>
       <p:sp>
         <p:nvSpPr>
-          <p:cNvPr id="13" name="TextBox 12"/>
-          <p:cNvSpPr txBox="1"/>
-          <p:nvPr/>
-        </p:nvSpPr>
-        <p:spPr>
-          <a:xfrm>
-            <a:off x="6834934" y="352332"/>
-            <a:ext cx="1349221" cy="369332"/>
-          </a:xfrm>
-          <a:prstGeom prst="rect">
-            <a:avLst/>
-          </a:prstGeom>
-          <a:noFill/>
-        </p:spPr>
-        <p:txBody>
-          <a:bodyPr wrap="square" rtlCol="0">
-            <a:spAutoFit/>
-          </a:bodyPr>
-          <a:lstStyle/>
-          <a:p>
-            <a:r>
-              <a:rPr lang="en-US" dirty="0" smtClean="0">
-                <a:solidFill>
-                  <a:schemeClr val="bg2"/>
-                </a:solidFill>
-                <a:latin typeface="Copperplate Gothic Bold" charset="0"/>
-                <a:ea typeface="Copperplate Gothic Bold" charset="0"/>
-                <a:cs typeface="Copperplate Gothic Bold" charset="0"/>
-              </a:rPr>
-              <a:t>history</a:t>
-            </a:r>
-            <a:endParaRPr lang="en-US" sz="1200" dirty="0">
-              <a:solidFill>
-                <a:schemeClr val="bg2"/>
-              </a:solidFill>
-              <a:latin typeface="Copperplate Gothic Bold" charset="0"/>
-              <a:ea typeface="Copperplate Gothic Bold" charset="0"/>
-              <a:cs typeface="Copperplate Gothic Bold" charset="0"/>
-            </a:endParaRPr>
-          </a:p>
-        </p:txBody>
-      </p:sp>
-      <p:sp>
-        <p:nvSpPr>
-          <p:cNvPr id="14" name="TextBox 13"/>
-          <p:cNvSpPr txBox="1"/>
-          <p:nvPr/>
-        </p:nvSpPr>
-        <p:spPr>
-          <a:xfrm>
-            <a:off x="8282734" y="352332"/>
-            <a:ext cx="1349221" cy="369332"/>
-          </a:xfrm>
-          <a:prstGeom prst="rect">
-            <a:avLst/>
-          </a:prstGeom>
-          <a:noFill/>
-        </p:spPr>
-        <p:txBody>
-          <a:bodyPr wrap="square" rtlCol="0">
-            <a:spAutoFit/>
-          </a:bodyPr>
-          <a:lstStyle/>
-          <a:p>
-            <a:r>
-              <a:rPr lang="en-US" dirty="0" smtClean="0">
-                <a:solidFill>
-                  <a:schemeClr val="bg2"/>
-                </a:solidFill>
-                <a:latin typeface="Copperplate Gothic Bold" charset="0"/>
-                <a:ea typeface="Copperplate Gothic Bold" charset="0"/>
-                <a:cs typeface="Copperplate Gothic Bold" charset="0"/>
-              </a:rPr>
-              <a:t>contact</a:t>
-            </a:r>
-            <a:endParaRPr lang="en-US" sz="1200" dirty="0">
-              <a:solidFill>
-                <a:schemeClr val="bg2"/>
-              </a:solidFill>
-              <a:latin typeface="Copperplate Gothic Bold" charset="0"/>
-              <a:ea typeface="Copperplate Gothic Bold" charset="0"/>
-              <a:cs typeface="Copperplate Gothic Bold" charset="0"/>
-            </a:endParaRPr>
-          </a:p>
-        </p:txBody>
-      </p:sp>
-      <p:sp>
-        <p:nvSpPr>
-          <p:cNvPr id="19" name="Rectangle 18"/>
+          <p:cNvPr id="3" name="Rectangle 2"/>
           <p:cNvSpPr/>
           <p:nvPr/>
         </p:nvSpPr>
         <p:spPr>
           <a:xfrm>
-            <a:off x="0" y="1107828"/>
-            <a:ext cx="12192000" cy="1376291"/>
+            <a:off x="0" y="-29177"/>
+            <a:ext cx="12192000" cy="476000"/>
           </a:xfrm>
           <a:prstGeom prst="rect">
             <a:avLst/>
           </a:prstGeom>
           <a:solidFill>
-            <a:schemeClr val="bg2">
-              <a:alpha val="40000"/>
-            </a:schemeClr>
+            <a:srgbClr val="C00000"/>
           </a:solidFill>
           <a:ln>
             <a:noFill/>
@@ -6689,201 +6533,143 @@
           <a:lstStyle/>
           <a:p>
             <a:pPr algn="ctr"/>
-            <a:r>
-              <a:rPr lang="en-US" sz="4000" b="1" dirty="0" smtClean="0">
-                <a:solidFill>
-                  <a:srgbClr val="C00000"/>
+            <a:endParaRPr lang="en-US"/>
+          </a:p>
+        </p:txBody>
+      </p:sp>
+      <p:pic>
+        <p:nvPicPr>
+          <p:cNvPr id="7" name="Picture 6"/>
+          <p:cNvPicPr>
+            <a:picLocks noChangeAspect="1"/>
+          </p:cNvPicPr>
+          <p:nvPr/>
+        </p:nvPicPr>
+        <p:blipFill>
+          <a:blip r:embed="rId3" cstate="screen">
+            <a:extLst>
+              <a:ext uri="{28A0092B-C50C-407E-A947-70E740481C1C}">
+                <a14:useLocalDpi xmlns:a14="http://schemas.microsoft.com/office/drawing/2010/main"/>
+              </a:ext>
+            </a:extLst>
+          </a:blip>
+          <a:stretch>
+            <a:fillRect/>
+          </a:stretch>
+        </p:blipFill>
+        <p:spPr>
+          <a:xfrm>
+            <a:off x="169325" y="25425"/>
+            <a:ext cx="200383" cy="318845"/>
+          </a:xfrm>
+          <a:prstGeom prst="rect">
+            <a:avLst/>
+          </a:prstGeom>
+        </p:spPr>
+      </p:pic>
+      <p:sp>
+        <p:nvSpPr>
+          <p:cNvPr id="8" name="TextBox 7"/>
+          <p:cNvSpPr txBox="1"/>
+          <p:nvPr/>
+        </p:nvSpPr>
+        <p:spPr>
+          <a:xfrm>
+            <a:off x="362337" y="-92117"/>
+            <a:ext cx="2574788" cy="477054"/>
+          </a:xfrm>
+          <a:prstGeom prst="rect">
+            <a:avLst/>
+          </a:prstGeom>
+          <a:noFill/>
+        </p:spPr>
+        <p:txBody>
+          <a:bodyPr wrap="square" rtlCol="0">
+            <a:spAutoFit/>
+          </a:bodyPr>
+          <a:lstStyle/>
+          <a:p>
+            <a:r>
+              <a:rPr lang="en-US" b="1" dirty="0">
+                <a:solidFill>
+                  <a:srgbClr val="FFC000"/>
+                </a:solidFill>
+                <a:latin typeface="Bodoni 72 Smallcaps Book" charset="0"/>
+                <a:ea typeface="Bodoni 72 Smallcaps Book" charset="0"/>
+                <a:cs typeface="Bodoni 72 Smallcaps Book" charset="0"/>
+              </a:rPr>
+              <a:t>t</a:t>
+            </a:r>
+            <a:r>
+              <a:rPr lang="en-US" b="1" dirty="0" smtClean="0">
+                <a:solidFill>
+                  <a:srgbClr val="FFC000"/>
+                </a:solidFill>
+                <a:latin typeface="Bodoni 72 Smallcaps Book" charset="0"/>
+                <a:ea typeface="Bodoni 72 Smallcaps Book" charset="0"/>
+                <a:cs typeface="Bodoni 72 Smallcaps Book" charset="0"/>
+              </a:rPr>
+              <a:t>heta tau</a:t>
+            </a:r>
+          </a:p>
+          <a:p>
+            <a:r>
+              <a:rPr lang="en-US" sz="700" b="1" dirty="0" smtClean="0">
+                <a:solidFill>
+                  <a:srgbClr val="FFC000"/>
+                </a:solidFill>
+                <a:latin typeface="Bodoni 72 Smallcaps Book" charset="0"/>
+                <a:ea typeface="Bodoni 72 Smallcaps Book" charset="0"/>
+                <a:cs typeface="Bodoni 72 Smallcaps Book" charset="0"/>
+              </a:rPr>
+              <a:t>PROFESSIONAL ENGINEERING FRATERNITY</a:t>
+            </a:r>
+            <a:endParaRPr lang="en-US" sz="800" b="1" dirty="0" smtClean="0">
+              <a:solidFill>
+                <a:srgbClr val="FFC000"/>
+              </a:solidFill>
+              <a:latin typeface="Bodoni 72 Smallcaps Book" charset="0"/>
+              <a:ea typeface="Bodoni 72 Smallcaps Book" charset="0"/>
+              <a:cs typeface="Bodoni 72 Smallcaps Book" charset="0"/>
+            </a:endParaRPr>
+          </a:p>
+        </p:txBody>
+      </p:sp>
+      <p:sp>
+        <p:nvSpPr>
+          <p:cNvPr id="9" name="TextBox 8"/>
+          <p:cNvSpPr txBox="1"/>
+          <p:nvPr/>
+        </p:nvSpPr>
+        <p:spPr>
+          <a:xfrm>
+            <a:off x="3738071" y="73931"/>
+            <a:ext cx="771641" cy="281281"/>
+          </a:xfrm>
+          <a:prstGeom prst="rect">
+            <a:avLst/>
+          </a:prstGeom>
+          <a:noFill/>
+        </p:spPr>
+        <p:txBody>
+          <a:bodyPr wrap="square" rtlCol="0">
+            <a:spAutoFit/>
+          </a:bodyPr>
+          <a:lstStyle/>
+          <a:p>
+            <a:pPr algn="ctr"/>
+            <a:r>
+              <a:rPr lang="en-US" sz="1200" dirty="0" smtClean="0">
+                <a:solidFill>
+                  <a:schemeClr val="bg2"/>
                 </a:solidFill>
                 <a:latin typeface="Copperplate Gothic Bold" charset="0"/>
                 <a:ea typeface="Copperplate Gothic Bold" charset="0"/>
                 <a:cs typeface="Copperplate Gothic Bold" charset="0"/>
               </a:rPr>
-              <a:t>Theta Gamma Chapter</a:t>
-            </a:r>
-          </a:p>
-          <a:p>
-            <a:pPr algn="ctr"/>
-            <a:r>
-              <a:rPr lang="en-US" sz="2400" b="1" dirty="0">
-                <a:solidFill>
-                  <a:srgbClr val="C00000"/>
-                </a:solidFill>
-                <a:latin typeface="Copperplate Gothic Bold" charset="0"/>
-                <a:ea typeface="Copperplate Gothic Bold" charset="0"/>
-                <a:cs typeface="Copperplate Gothic Bold" charset="0"/>
-              </a:rPr>
-              <a:t>t</a:t>
-            </a:r>
-            <a:r>
-              <a:rPr lang="en-US" sz="2400" b="1" dirty="0" smtClean="0">
-                <a:solidFill>
-                  <a:srgbClr val="C00000"/>
-                </a:solidFill>
-                <a:latin typeface="Copperplate Gothic Bold" charset="0"/>
-                <a:ea typeface="Copperplate Gothic Bold" charset="0"/>
-                <a:cs typeface="Copperplate Gothic Bold" charset="0"/>
-              </a:rPr>
-              <a:t>he university of michigan</a:t>
-            </a:r>
-            <a:endParaRPr lang="en-US" sz="2400" b="1" dirty="0">
-              <a:solidFill>
-                <a:srgbClr val="C00000"/>
-              </a:solidFill>
-              <a:latin typeface="Copperplate Gothic Bold" charset="0"/>
-              <a:ea typeface="Copperplate Gothic Bold" charset="0"/>
-              <a:cs typeface="Copperplate Gothic Bold" charset="0"/>
-            </a:endParaRPr>
-          </a:p>
-        </p:txBody>
-      </p:sp>
-      <p:sp>
-        <p:nvSpPr>
-          <p:cNvPr id="21" name="TextBox 20"/>
-          <p:cNvSpPr txBox="1"/>
-          <p:nvPr/>
-        </p:nvSpPr>
-        <p:spPr>
-          <a:xfrm>
-            <a:off x="609599" y="2331780"/>
-            <a:ext cx="854721" cy="2646878"/>
-          </a:xfrm>
-          <a:prstGeom prst="rect">
-            <a:avLst/>
-          </a:prstGeom>
-          <a:noFill/>
-        </p:spPr>
-        <p:txBody>
-          <a:bodyPr wrap="none" rtlCol="0">
-            <a:spAutoFit/>
-          </a:bodyPr>
-          <a:lstStyle/>
-          <a:p>
-            <a:r>
-              <a:rPr lang="en-US" sz="16600" dirty="0" smtClean="0">
-                <a:solidFill>
-                  <a:schemeClr val="bg1"/>
-                </a:solidFill>
-              </a:rPr>
-              <a:t>{</a:t>
-            </a:r>
-            <a:endParaRPr lang="en-US" dirty="0">
-              <a:solidFill>
-                <a:schemeClr val="bg1"/>
-              </a:solidFill>
-            </a:endParaRPr>
-          </a:p>
-        </p:txBody>
-      </p:sp>
-      <p:sp>
-        <p:nvSpPr>
-          <p:cNvPr id="22" name="TextBox 21"/>
-          <p:cNvSpPr txBox="1"/>
-          <p:nvPr/>
-        </p:nvSpPr>
-        <p:spPr>
-          <a:xfrm>
-            <a:off x="4374083" y="2331780"/>
-            <a:ext cx="854721" cy="2646878"/>
-          </a:xfrm>
-          <a:prstGeom prst="rect">
-            <a:avLst/>
-          </a:prstGeom>
-          <a:noFill/>
-        </p:spPr>
-        <p:txBody>
-          <a:bodyPr wrap="none" rtlCol="0">
-            <a:spAutoFit/>
-          </a:bodyPr>
-          <a:lstStyle/>
-          <a:p>
-            <a:r>
-              <a:rPr lang="en-US" sz="16600" dirty="0">
-                <a:solidFill>
-                  <a:schemeClr val="bg1"/>
-                </a:solidFill>
-              </a:rPr>
-              <a:t>}</a:t>
-            </a:r>
-            <a:endParaRPr lang="en-US" dirty="0">
-              <a:solidFill>
-                <a:schemeClr val="bg1"/>
-              </a:solidFill>
-            </a:endParaRPr>
-          </a:p>
-        </p:txBody>
-      </p:sp>
-      <p:sp>
-        <p:nvSpPr>
-          <p:cNvPr id="23" name="TextBox 22"/>
-          <p:cNvSpPr txBox="1"/>
-          <p:nvPr/>
-        </p:nvSpPr>
-        <p:spPr>
-          <a:xfrm>
-            <a:off x="1464320" y="3145125"/>
-            <a:ext cx="3214360" cy="1477328"/>
-          </a:xfrm>
-          <a:prstGeom prst="rect">
-            <a:avLst/>
-          </a:prstGeom>
-          <a:noFill/>
-        </p:spPr>
-        <p:txBody>
-          <a:bodyPr wrap="square" rtlCol="0">
-            <a:spAutoFit/>
-          </a:bodyPr>
-          <a:lstStyle/>
-          <a:p>
-            <a:r>
-              <a:rPr lang="en-US" b="1" i="1" dirty="0" smtClean="0">
-                <a:latin typeface="Segoe Print" charset="0"/>
-                <a:ea typeface="Segoe Print" charset="0"/>
-                <a:cs typeface="Segoe Print" charset="0"/>
-              </a:rPr>
-              <a:t>“Theta Tau isn’t just a fraternity…it’s a brotherhood that likes to take pictures on very frozen lakes”</a:t>
-            </a:r>
-            <a:endParaRPr lang="en-US" b="1" i="1" dirty="0">
-              <a:latin typeface="Segoe Print" charset="0"/>
-              <a:ea typeface="Segoe Print" charset="0"/>
-              <a:cs typeface="Segoe Print" charset="0"/>
-            </a:endParaRPr>
-          </a:p>
-        </p:txBody>
-      </p:sp>
-      <p:sp>
-        <p:nvSpPr>
-          <p:cNvPr id="24" name="TextBox 23"/>
-          <p:cNvSpPr txBox="1"/>
-          <p:nvPr/>
-        </p:nvSpPr>
-        <p:spPr>
-          <a:xfrm>
-            <a:off x="10967891" y="352331"/>
-            <a:ext cx="965030" cy="369332"/>
-          </a:xfrm>
-          <a:prstGeom prst="rect">
-            <a:avLst/>
-          </a:prstGeom>
-          <a:noFill/>
-        </p:spPr>
-        <p:txBody>
-          <a:bodyPr wrap="square" rtlCol="0">
-            <a:spAutoFit/>
-          </a:bodyPr>
-          <a:lstStyle/>
-          <a:p>
-            <a:r>
-              <a:rPr lang="en-US" dirty="0" smtClean="0">
-                <a:solidFill>
-                  <a:schemeClr val="bg2"/>
-                </a:solidFill>
-                <a:latin typeface="Copperplate Gothic Bold" charset="0"/>
-                <a:ea typeface="Copperplate Gothic Bold" charset="0"/>
-                <a:cs typeface="Copperplate Gothic Bold" charset="0"/>
-              </a:rPr>
-              <a:t>login</a:t>
-            </a:r>
-            <a:endParaRPr lang="en-US" sz="1200" dirty="0">
+              <a:t>about</a:t>
+            </a:r>
+            <a:endParaRPr lang="en-US" sz="1000" dirty="0">
               <a:solidFill>
                 <a:schemeClr val="bg2"/>
               </a:solidFill>
@@ -6896,14 +6682,194 @@
       </p:sp>
       <p:sp>
         <p:nvSpPr>
+          <p:cNvPr id="12" name="TextBox 11"/>
+          <p:cNvSpPr txBox="1"/>
+          <p:nvPr/>
+        </p:nvSpPr>
+        <p:spPr>
+          <a:xfrm>
+            <a:off x="4709011" y="62156"/>
+            <a:ext cx="951245" cy="277000"/>
+          </a:xfrm>
+          <a:prstGeom prst="rect">
+            <a:avLst/>
+          </a:prstGeom>
+          <a:noFill/>
+        </p:spPr>
+        <p:txBody>
+          <a:bodyPr wrap="square" rtlCol="0">
+            <a:spAutoFit/>
+          </a:bodyPr>
+          <a:lstStyle/>
+          <a:p>
+            <a:pPr algn="ctr"/>
+            <a:r>
+              <a:rPr lang="en-US" sz="1200" dirty="0" smtClean="0">
+                <a:solidFill>
+                  <a:schemeClr val="bg2"/>
+                </a:solidFill>
+                <a:latin typeface="Copperplate Gothic Bold" charset="0"/>
+                <a:ea typeface="Copperplate Gothic Bold" charset="0"/>
+                <a:cs typeface="Copperplate Gothic Bold" charset="0"/>
+              </a:rPr>
+              <a:t>members</a:t>
+            </a:r>
+            <a:endParaRPr lang="en-US" sz="1000" dirty="0">
+              <a:solidFill>
+                <a:schemeClr val="bg2"/>
+              </a:solidFill>
+              <a:latin typeface="Copperplate Gothic Bold" charset="0"/>
+              <a:ea typeface="Copperplate Gothic Bold" charset="0"/>
+              <a:cs typeface="Copperplate Gothic Bold" charset="0"/>
+            </a:endParaRPr>
+          </a:p>
+        </p:txBody>
+      </p:sp>
+      <p:sp>
+        <p:nvSpPr>
+          <p:cNvPr id="13" name="TextBox 12"/>
+          <p:cNvSpPr txBox="1"/>
+          <p:nvPr/>
+        </p:nvSpPr>
+        <p:spPr>
+          <a:xfrm>
+            <a:off x="5936171" y="69497"/>
+            <a:ext cx="920104" cy="277000"/>
+          </a:xfrm>
+          <a:prstGeom prst="rect">
+            <a:avLst/>
+          </a:prstGeom>
+          <a:noFill/>
+        </p:spPr>
+        <p:txBody>
+          <a:bodyPr wrap="square" rtlCol="0">
+            <a:spAutoFit/>
+          </a:bodyPr>
+          <a:lstStyle/>
+          <a:p>
+            <a:pPr algn="ctr"/>
+            <a:r>
+              <a:rPr lang="en-US" sz="1200" dirty="0" smtClean="0">
+                <a:solidFill>
+                  <a:schemeClr val="bg2"/>
+                </a:solidFill>
+                <a:latin typeface="Copperplate Gothic Bold" charset="0"/>
+                <a:ea typeface="Copperplate Gothic Bold" charset="0"/>
+                <a:cs typeface="Copperplate Gothic Bold" charset="0"/>
+              </a:rPr>
+              <a:t>history</a:t>
+            </a:r>
+            <a:endParaRPr lang="en-US" sz="1000" dirty="0">
+              <a:solidFill>
+                <a:schemeClr val="bg2"/>
+              </a:solidFill>
+              <a:latin typeface="Copperplate Gothic Bold" charset="0"/>
+              <a:ea typeface="Copperplate Gothic Bold" charset="0"/>
+              <a:cs typeface="Copperplate Gothic Bold" charset="0"/>
+            </a:endParaRPr>
+          </a:p>
+        </p:txBody>
+      </p:sp>
+      <p:sp>
+        <p:nvSpPr>
+          <p:cNvPr id="14" name="TextBox 13"/>
+          <p:cNvSpPr txBox="1"/>
+          <p:nvPr/>
+        </p:nvSpPr>
+        <p:spPr>
+          <a:xfrm>
+            <a:off x="7132190" y="65724"/>
+            <a:ext cx="942289" cy="277000"/>
+          </a:xfrm>
+          <a:prstGeom prst="rect">
+            <a:avLst/>
+          </a:prstGeom>
+          <a:noFill/>
+        </p:spPr>
+        <p:txBody>
+          <a:bodyPr wrap="square" rtlCol="0">
+            <a:spAutoFit/>
+          </a:bodyPr>
+          <a:lstStyle/>
+          <a:p>
+            <a:pPr algn="ctr"/>
+            <a:r>
+              <a:rPr lang="en-US" sz="1200" dirty="0" smtClean="0">
+                <a:solidFill>
+                  <a:schemeClr val="bg2"/>
+                </a:solidFill>
+                <a:latin typeface="Copperplate Gothic Bold" charset="0"/>
+                <a:ea typeface="Copperplate Gothic Bold" charset="0"/>
+                <a:cs typeface="Copperplate Gothic Bold" charset="0"/>
+              </a:rPr>
+              <a:t>contact</a:t>
+            </a:r>
+            <a:endParaRPr lang="en-US" sz="1000" dirty="0">
+              <a:solidFill>
+                <a:schemeClr val="bg2"/>
+              </a:solidFill>
+              <a:latin typeface="Copperplate Gothic Bold" charset="0"/>
+              <a:ea typeface="Copperplate Gothic Bold" charset="0"/>
+              <a:cs typeface="Copperplate Gothic Bold" charset="0"/>
+            </a:endParaRPr>
+          </a:p>
+        </p:txBody>
+      </p:sp>
+      <p:sp>
+        <p:nvSpPr>
+          <p:cNvPr id="24" name="TextBox 23"/>
+          <p:cNvSpPr txBox="1"/>
+          <p:nvPr/>
+        </p:nvSpPr>
+        <p:spPr>
+          <a:xfrm>
+            <a:off x="11259927" y="49716"/>
+            <a:ext cx="687815" cy="276999"/>
+          </a:xfrm>
+          <a:prstGeom prst="rect">
+            <a:avLst/>
+          </a:prstGeom>
+          <a:noFill/>
+        </p:spPr>
+        <p:txBody>
+          <a:bodyPr wrap="square" rtlCol="0">
+            <a:spAutoFit/>
+          </a:bodyPr>
+          <a:lstStyle/>
+          <a:p>
+            <a:pPr algn="ctr"/>
+            <a:r>
+              <a:rPr lang="en-US" sz="1200" dirty="0" smtClean="0">
+                <a:solidFill>
+                  <a:schemeClr val="bg2"/>
+                </a:solidFill>
+                <a:latin typeface="Copperplate Gothic Bold" charset="0"/>
+                <a:ea typeface="Copperplate Gothic Bold" charset="0"/>
+                <a:cs typeface="Copperplate Gothic Bold" charset="0"/>
+              </a:rPr>
+              <a:t>login</a:t>
+            </a:r>
+            <a:endParaRPr lang="en-US" sz="1000" dirty="0">
+              <a:solidFill>
+                <a:schemeClr val="bg2"/>
+              </a:solidFill>
+              <a:latin typeface="Copperplate Gothic Bold" charset="0"/>
+              <a:ea typeface="Copperplate Gothic Bold" charset="0"/>
+              <a:cs typeface="Copperplate Gothic Bold" charset="0"/>
+            </a:endParaRPr>
+          </a:p>
+        </p:txBody>
+      </p:sp>
+      <p:sp>
+        <p:nvSpPr>
           <p:cNvPr id="25" name="Rectangle 24"/>
           <p:cNvSpPr/>
           <p:nvPr/>
         </p:nvSpPr>
         <p:spPr>
           <a:xfrm>
-            <a:off x="-9530" y="1024640"/>
-            <a:ext cx="3314204" cy="76984"/>
+            <a:off x="0" y="369769"/>
+            <a:ext cx="2421467" cy="74881"/>
           </a:xfrm>
           <a:prstGeom prst="rect">
             <a:avLst/>
@@ -6948,7 +6914,7 @@
         </p:nvSpPr>
         <p:spPr>
           <a:xfrm>
-            <a:off x="5148183" y="3714275"/>
+            <a:off x="6282910" y="3261043"/>
             <a:ext cx="2356997" cy="646331"/>
           </a:xfrm>
           <a:prstGeom prst="rect">
@@ -6981,7 +6947,7 @@
       </p:sp>
       <p:pic>
         <p:nvPicPr>
-          <p:cNvPr id="4" name="Picture 3"/>
+          <p:cNvPr id="17" name="Picture 16"/>
           <p:cNvPicPr>
             <a:picLocks noChangeAspect="1"/>
           </p:cNvPicPr>
@@ -6995,8 +6961,8 @@
         </p:blipFill>
         <p:spPr>
           <a:xfrm>
-            <a:off x="3468223" y="0"/>
-            <a:ext cx="825500" cy="1077218"/>
+            <a:off x="3579926" y="-26304"/>
+            <a:ext cx="354966" cy="463205"/>
           </a:xfrm>
           <a:prstGeom prst="rect">
             <a:avLst/>
@@ -7005,7 +6971,7 @@
       </p:pic>
       <p:pic>
         <p:nvPicPr>
-          <p:cNvPr id="20" name="Picture 19"/>
+          <p:cNvPr id="18" name="Picture 17"/>
           <p:cNvPicPr>
             <a:picLocks noChangeAspect="1"/>
           </p:cNvPicPr>
@@ -7019,8 +6985,8 @@
         </p:blipFill>
         <p:spPr>
           <a:xfrm>
-            <a:off x="4839821" y="8022"/>
-            <a:ext cx="825500" cy="1077218"/>
+            <a:off x="4380872" y="-27648"/>
+            <a:ext cx="355996" cy="464549"/>
           </a:xfrm>
           <a:prstGeom prst="rect">
             <a:avLst/>
@@ -7029,7 +6995,7 @@
       </p:pic>
       <p:pic>
         <p:nvPicPr>
-          <p:cNvPr id="5" name="Picture 4"/>
+          <p:cNvPr id="20" name="Picture 19"/>
           <p:cNvPicPr>
             <a:picLocks noChangeAspect="1"/>
           </p:cNvPicPr>
@@ -7049,8 +7015,8 @@
         </p:blipFill>
         <p:spPr>
           <a:xfrm>
-            <a:off x="4801443" y="813398"/>
-            <a:ext cx="216218" cy="323922"/>
+            <a:off x="4336472" y="274709"/>
+            <a:ext cx="95837" cy="143576"/>
           </a:xfrm>
           <a:prstGeom prst="rect">
             <a:avLst/>
@@ -7059,14 +7025,14 @@
       </p:pic>
       <p:sp>
         <p:nvSpPr>
-          <p:cNvPr id="10" name="Rectangle 9"/>
+          <p:cNvPr id="27" name="Rectangle 26"/>
           <p:cNvSpPr/>
           <p:nvPr/>
         </p:nvSpPr>
         <p:spPr>
           <a:xfrm>
-            <a:off x="3835980" y="1093263"/>
-            <a:ext cx="2998954" cy="2002960"/>
+            <a:off x="3709495" y="436901"/>
+            <a:ext cx="1977427" cy="1183187"/>
           </a:xfrm>
           <a:prstGeom prst="rect">
             <a:avLst/>
@@ -7095,7 +7061,7 @@
           </a:fontRef>
         </p:style>
         <p:txBody>
-          <a:bodyPr lIns="274320" tIns="182880" rIns="182880" rtlCol="0" anchor="t" anchorCtr="0"/>
+          <a:bodyPr lIns="182880" tIns="91440" rIns="182880" rtlCol="0" anchor="t" anchorCtr="0"/>
           <a:lstStyle/>
           <a:p>
             <a:pPr>
@@ -7104,7 +7070,7 @@
               </a:lnSpc>
             </a:pPr>
             <a:r>
-              <a:rPr lang="en-US" b="1" dirty="0" smtClean="0">
+              <a:rPr lang="en-US" sz="1100" b="1" dirty="0" smtClean="0">
                 <a:solidFill>
                   <a:srgbClr val="C00000"/>
                 </a:solidFill>
@@ -7122,7 +7088,7 @@
               </a:lnSpc>
             </a:pPr>
             <a:r>
-              <a:rPr lang="en-US" b="1" dirty="0" smtClean="0">
+              <a:rPr lang="en-US" sz="1100" b="1" dirty="0" smtClean="0">
                 <a:solidFill>
                   <a:srgbClr val="C00000"/>
                 </a:solidFill>
@@ -7140,7 +7106,7 @@
               </a:lnSpc>
             </a:pPr>
             <a:r>
-              <a:rPr lang="en-US" b="1" dirty="0" smtClean="0">
+              <a:rPr lang="en-US" sz="1100" b="1" dirty="0" smtClean="0">
                 <a:solidFill>
                   <a:srgbClr val="C00000"/>
                 </a:solidFill>
@@ -7158,7 +7124,7 @@
               </a:lnSpc>
             </a:pPr>
             <a:r>
-              <a:rPr lang="en-US" b="1" dirty="0" smtClean="0">
+              <a:rPr lang="en-US" sz="1100" b="1" dirty="0" smtClean="0">
                 <a:solidFill>
                   <a:srgbClr val="C00000"/>
                 </a:solidFill>
@@ -7168,7 +7134,7 @@
               </a:rPr>
               <a:t>Family Tree</a:t>
             </a:r>
-            <a:endParaRPr lang="en-US" b="1" dirty="0">
+            <a:endParaRPr lang="en-US" sz="1100" b="1" dirty="0">
               <a:solidFill>
                 <a:srgbClr val="C00000"/>
               </a:solidFill>
@@ -7182,7 +7148,7 @@
     </p:spTree>
     <p:extLst>
       <p:ext uri="{BB962C8B-B14F-4D97-AF65-F5344CB8AC3E}">
-        <p14:creationId xmlns:p14="http://schemas.microsoft.com/office/powerpoint/2010/main" val="64784016"/>
+        <p14:creationId xmlns:p14="http://schemas.microsoft.com/office/powerpoint/2010/main" val="1091105966"/>
       </p:ext>
     </p:extLst>
   </p:cSld>

</xml_diff>